<commit_message>
implemented comments from 1st round
</commit_message>
<xml_diff>
--- a/manuscript/scheme_multibridge.pptx
+++ b/manuscript/scheme_multibridge.pptx
@@ -243,7 +243,7 @@
           <a:p>
             <a:fld id="{B3A21784-E1B4-8C4A-A52C-8A1F4FEBB89F}" type="datetimeFigureOut">
               <a:rPr lang="en-US" smtClean="0"/>
-              <a:t>10/15/20</a:t>
+              <a:t>11/19/20</a:t>
             </a:fld>
             <a:endParaRPr lang="en-US"/>
           </a:p>
@@ -413,7 +413,7 @@
           <a:p>
             <a:fld id="{B3A21784-E1B4-8C4A-A52C-8A1F4FEBB89F}" type="datetimeFigureOut">
               <a:rPr lang="en-US" smtClean="0"/>
-              <a:t>10/15/20</a:t>
+              <a:t>11/19/20</a:t>
             </a:fld>
             <a:endParaRPr lang="en-US"/>
           </a:p>
@@ -593,7 +593,7 @@
           <a:p>
             <a:fld id="{B3A21784-E1B4-8C4A-A52C-8A1F4FEBB89F}" type="datetimeFigureOut">
               <a:rPr lang="en-US" smtClean="0"/>
-              <a:t>10/15/20</a:t>
+              <a:t>11/19/20</a:t>
             </a:fld>
             <a:endParaRPr lang="en-US"/>
           </a:p>
@@ -763,7 +763,7 @@
           <a:p>
             <a:fld id="{B3A21784-E1B4-8C4A-A52C-8A1F4FEBB89F}" type="datetimeFigureOut">
               <a:rPr lang="en-US" smtClean="0"/>
-              <a:t>10/15/20</a:t>
+              <a:t>11/19/20</a:t>
             </a:fld>
             <a:endParaRPr lang="en-US"/>
           </a:p>
@@ -1009,7 +1009,7 @@
           <a:p>
             <a:fld id="{B3A21784-E1B4-8C4A-A52C-8A1F4FEBB89F}" type="datetimeFigureOut">
               <a:rPr lang="en-US" smtClean="0"/>
-              <a:t>10/15/20</a:t>
+              <a:t>11/19/20</a:t>
             </a:fld>
             <a:endParaRPr lang="en-US"/>
           </a:p>
@@ -1241,7 +1241,7 @@
           <a:p>
             <a:fld id="{B3A21784-E1B4-8C4A-A52C-8A1F4FEBB89F}" type="datetimeFigureOut">
               <a:rPr lang="en-US" smtClean="0"/>
-              <a:t>10/15/20</a:t>
+              <a:t>11/19/20</a:t>
             </a:fld>
             <a:endParaRPr lang="en-US"/>
           </a:p>
@@ -1608,7 +1608,7 @@
           <a:p>
             <a:fld id="{B3A21784-E1B4-8C4A-A52C-8A1F4FEBB89F}" type="datetimeFigureOut">
               <a:rPr lang="en-US" smtClean="0"/>
-              <a:t>10/15/20</a:t>
+              <a:t>11/19/20</a:t>
             </a:fld>
             <a:endParaRPr lang="en-US"/>
           </a:p>
@@ -1726,7 +1726,7 @@
           <a:p>
             <a:fld id="{B3A21784-E1B4-8C4A-A52C-8A1F4FEBB89F}" type="datetimeFigureOut">
               <a:rPr lang="en-US" smtClean="0"/>
-              <a:t>10/15/20</a:t>
+              <a:t>11/19/20</a:t>
             </a:fld>
             <a:endParaRPr lang="en-US"/>
           </a:p>
@@ -1821,7 +1821,7 @@
           <a:p>
             <a:fld id="{B3A21784-E1B4-8C4A-A52C-8A1F4FEBB89F}" type="datetimeFigureOut">
               <a:rPr lang="en-US" smtClean="0"/>
-              <a:t>10/15/20</a:t>
+              <a:t>11/19/20</a:t>
             </a:fld>
             <a:endParaRPr lang="en-US"/>
           </a:p>
@@ -2098,7 +2098,7 @@
           <a:p>
             <a:fld id="{B3A21784-E1B4-8C4A-A52C-8A1F4FEBB89F}" type="datetimeFigureOut">
               <a:rPr lang="en-US" smtClean="0"/>
-              <a:t>10/15/20</a:t>
+              <a:t>11/19/20</a:t>
             </a:fld>
             <a:endParaRPr lang="en-US"/>
           </a:p>
@@ -2355,7 +2355,7 @@
           <a:p>
             <a:fld id="{B3A21784-E1B4-8C4A-A52C-8A1F4FEBB89F}" type="datetimeFigureOut">
               <a:rPr lang="en-US" smtClean="0"/>
-              <a:t>10/15/20</a:t>
+              <a:t>11/19/20</a:t>
             </a:fld>
             <a:endParaRPr lang="en-US"/>
           </a:p>
@@ -2568,7 +2568,7 @@
           <a:p>
             <a:fld id="{B3A21784-E1B4-8C4A-A52C-8A1F4FEBB89F}" type="datetimeFigureOut">
               <a:rPr lang="en-US" smtClean="0"/>
-              <a:t>10/15/20</a:t>
+              <a:t>11/19/20</a:t>
             </a:fld>
             <a:endParaRPr lang="en-US"/>
           </a:p>
@@ -2975,10 +2975,10 @@
       </p:grpSpPr>
       <p:sp>
         <p:nvSpPr>
-          <p:cNvPr id="10" name="Rounded Rectangle 9">
+          <p:cNvPr id="16" name="Rounded Rectangle 15">
             <a:extLst>
               <a:ext uri="{FF2B5EF4-FFF2-40B4-BE49-F238E27FC236}">
-                <a16:creationId xmlns:a16="http://schemas.microsoft.com/office/drawing/2014/main" id="{B6C43759-4EC8-4244-A056-E10897A89746}"/>
+                <a16:creationId xmlns:a16="http://schemas.microsoft.com/office/drawing/2014/main" id="{673496A4-2CED-C944-96F6-1BF70AE9A925}"/>
               </a:ext>
             </a:extLst>
           </p:cNvPr>
@@ -2987,8 +2987,8 @@
         </p:nvSpPr>
         <p:spPr>
           <a:xfrm>
-            <a:off x="344865" y="4732425"/>
-            <a:ext cx="2809382" cy="2409768"/>
+            <a:off x="4624046" y="1111303"/>
+            <a:ext cx="4589153" cy="986949"/>
           </a:xfrm>
           <a:prstGeom prst="roundRect">
             <a:avLst/>
@@ -3017,54 +3017,6 @@
           <a:lstStyle/>
           <a:p>
             <a:pPr algn="ctr"/>
-            <a:endParaRPr lang="en-US" sz="2520" dirty="0"/>
-          </a:p>
-        </p:txBody>
-      </p:sp>
-      <p:sp>
-        <p:nvSpPr>
-          <p:cNvPr id="16" name="Rounded Rectangle 15">
-            <a:extLst>
-              <a:ext uri="{FF2B5EF4-FFF2-40B4-BE49-F238E27FC236}">
-                <a16:creationId xmlns:a16="http://schemas.microsoft.com/office/drawing/2014/main" id="{673496A4-2CED-C944-96F6-1BF70AE9A925}"/>
-              </a:ext>
-            </a:extLst>
-          </p:cNvPr>
-          <p:cNvSpPr/>
-          <p:nvPr/>
-        </p:nvSpPr>
-        <p:spPr>
-          <a:xfrm>
-            <a:off x="4957011" y="2064500"/>
-            <a:ext cx="3626914" cy="1948567"/>
-          </a:xfrm>
-          <a:prstGeom prst="roundRect">
-            <a:avLst/>
-          </a:prstGeom>
-          <a:noFill/>
-          <a:ln w="38100"/>
-        </p:spPr>
-        <p:style>
-          <a:lnRef idx="2">
-            <a:schemeClr val="accent1">
-              <a:shade val="50000"/>
-            </a:schemeClr>
-          </a:lnRef>
-          <a:fillRef idx="1">
-            <a:schemeClr val="accent1"/>
-          </a:fillRef>
-          <a:effectRef idx="0">
-            <a:schemeClr val="accent1"/>
-          </a:effectRef>
-          <a:fontRef idx="minor">
-            <a:schemeClr val="lt1"/>
-          </a:fontRef>
-        </p:style>
-        <p:txBody>
-          <a:bodyPr rtlCol="0" anchor="ctr"/>
-          <a:lstStyle/>
-          <a:p>
-            <a:pPr algn="ctr"/>
             <a:endParaRPr lang="en-US" sz="2520"/>
           </a:p>
         </p:txBody>
@@ -3083,8 +3035,8 @@
         </p:nvSpPr>
         <p:spPr>
           <a:xfrm>
-            <a:off x="10111707" y="5274644"/>
-            <a:ext cx="2461093" cy="1938992"/>
+            <a:off x="7401101" y="3202891"/>
+            <a:ext cx="1857078" cy="692497"/>
           </a:xfrm>
           <a:prstGeom prst="rect">
             <a:avLst/>
@@ -3098,8 +3050,8 @@
           <a:lstStyle/>
           <a:p>
             <a:r>
-              <a:rPr lang="en-US" sz="2000" dirty="0"/>
-              <a:t>Extracts prior and posterior samples from truncated densities used in the bridge sampling algorithm</a:t>
+              <a:rPr lang="en-US" sz="1300" dirty="0"/>
+              <a:t>Samples from truncated densities used for bridge sampling</a:t>
             </a:r>
           </a:p>
         </p:txBody>
@@ -3116,14 +3068,14 @@
           <p:cNvCxnSpPr>
             <a:cxnSpLocks/>
             <a:stCxn id="16" idx="2"/>
-            <a:endCxn id="10" idx="0"/>
+            <a:endCxn id="227" idx="0"/>
           </p:cNvCxnSpPr>
           <p:nvPr/>
         </p:nvCxnSpPr>
         <p:spPr>
           <a:xfrm flipH="1">
-            <a:off x="1749556" y="4013067"/>
-            <a:ext cx="5020912" cy="719358"/>
+            <a:off x="1929337" y="2098252"/>
+            <a:ext cx="4989286" cy="507788"/>
           </a:xfrm>
           <a:prstGeom prst="straightConnector1">
             <a:avLst/>
@@ -3161,8 +3113,8 @@
         </p:nvSpPr>
         <p:spPr>
           <a:xfrm>
-            <a:off x="8561121" y="1341229"/>
-            <a:ext cx="2646878" cy="400110"/>
+            <a:off x="6021326" y="228028"/>
+            <a:ext cx="2010487" cy="707886"/>
           </a:xfrm>
           <a:prstGeom prst="rect">
             <a:avLst/>
@@ -3170,25 +3122,47 @@
           <a:noFill/>
         </p:spPr>
         <p:txBody>
-          <a:bodyPr wrap="none" rtlCol="0">
+          <a:bodyPr wrap="square" rtlCol="0">
             <a:spAutoFit/>
           </a:bodyPr>
           <a:lstStyle/>
           <a:p>
             <a:r>
-              <a:rPr lang="en-US" sz="2000" dirty="0" err="1">
+              <a:rPr lang="en-US" sz="1300" dirty="0" err="1">
                 <a:latin typeface="Courier New" panose="02070309020205020404" pitchFamily="49" charset="0"/>
                 <a:cs typeface="Courier New" panose="02070309020205020404" pitchFamily="49" charset="0"/>
               </a:rPr>
               <a:t>multBfInformed</a:t>
             </a:r>
             <a:r>
-              <a:rPr lang="en-US" sz="2000" dirty="0">
+              <a:rPr lang="en-US" sz="1300" dirty="0">
                 <a:latin typeface="Courier New" panose="02070309020205020404" pitchFamily="49" charset="0"/>
                 <a:cs typeface="Courier New" panose="02070309020205020404" pitchFamily="49" charset="0"/>
               </a:rPr>
               <a:t>()</a:t>
             </a:r>
+          </a:p>
+          <a:p>
+            <a:r>
+              <a:rPr lang="en-US" sz="1300" dirty="0" err="1">
+                <a:latin typeface="Courier New" panose="02070309020205020404" pitchFamily="49" charset="0"/>
+                <a:cs typeface="Courier New" panose="02070309020205020404" pitchFamily="49" charset="0"/>
+              </a:rPr>
+              <a:t>binomBfInformed</a:t>
+            </a:r>
+            <a:r>
+              <a:rPr lang="en-US" sz="1300" dirty="0">
+                <a:latin typeface="Courier New" panose="02070309020205020404" pitchFamily="49" charset="0"/>
+                <a:cs typeface="Courier New" panose="02070309020205020404" pitchFamily="49" charset="0"/>
+              </a:rPr>
+              <a:t>()</a:t>
+            </a:r>
+          </a:p>
+          <a:p>
+            <a:endParaRPr lang="en-US" sz="1400" dirty="0">
+              <a:latin typeface="Courier New" panose="02070309020205020404" pitchFamily="49" charset="0"/>
+              <a:cs typeface="Courier New" panose="02070309020205020404" pitchFamily="49" charset="0"/>
+            </a:endParaRPr>
           </a:p>
         </p:txBody>
       </p:sp>
@@ -3206,8 +3180,8 @@
         </p:nvSpPr>
         <p:spPr>
           <a:xfrm>
-            <a:off x="3622805" y="4876423"/>
-            <a:ext cx="1107996" cy="400110"/>
+            <a:off x="1506528" y="5855874"/>
+            <a:ext cx="829073" cy="307777"/>
           </a:xfrm>
           <a:prstGeom prst="rect">
             <a:avLst/>
@@ -3215,13 +3189,13 @@
           <a:noFill/>
         </p:spPr>
         <p:txBody>
-          <a:bodyPr wrap="none" rtlCol="0">
+          <a:bodyPr wrap="square" rtlCol="0">
             <a:spAutoFit/>
           </a:bodyPr>
           <a:lstStyle/>
           <a:p>
             <a:r>
-              <a:rPr lang="en-US" sz="2000" dirty="0">
+              <a:rPr lang="en-US" sz="1400" dirty="0">
                 <a:latin typeface="Courier New" panose="02070309020205020404" pitchFamily="49" charset="0"/>
                 <a:cs typeface="Courier New" panose="02070309020205020404" pitchFamily="49" charset="0"/>
               </a:rPr>
@@ -3244,8 +3218,8 @@
         </p:nvSpPr>
         <p:spPr>
           <a:xfrm>
-            <a:off x="505807" y="4831821"/>
-            <a:ext cx="1569660" cy="400110"/>
+            <a:off x="1323723" y="3017520"/>
+            <a:ext cx="1151277" cy="307777"/>
           </a:xfrm>
           <a:prstGeom prst="rect">
             <a:avLst/>
@@ -3253,13 +3227,13 @@
           <a:noFill/>
         </p:spPr>
         <p:txBody>
-          <a:bodyPr wrap="none" rtlCol="0">
+          <a:bodyPr wrap="square" rtlCol="0">
             <a:spAutoFit/>
           </a:bodyPr>
           <a:lstStyle/>
           <a:p>
             <a:r>
-              <a:rPr lang="en-US" sz="2000" dirty="0">
+              <a:rPr lang="en-US" sz="1400" dirty="0">
                 <a:latin typeface="Courier New" panose="02070309020205020404" pitchFamily="49" charset="0"/>
                 <a:cs typeface="Courier New" panose="02070309020205020404" pitchFamily="49" charset="0"/>
               </a:rPr>
@@ -3282,8 +3256,8 @@
         </p:nvSpPr>
         <p:spPr>
           <a:xfrm>
-            <a:off x="5127214" y="192278"/>
-            <a:ext cx="2338397" cy="461665"/>
+            <a:off x="1089911" y="43362"/>
+            <a:ext cx="1936320" cy="369332"/>
           </a:xfrm>
           <a:prstGeom prst="rect">
             <a:avLst/>
@@ -3291,14 +3265,14 @@
           <a:noFill/>
         </p:spPr>
         <p:txBody>
-          <a:bodyPr wrap="none" rtlCol="0">
+          <a:bodyPr wrap="square" rtlCol="0">
             <a:spAutoFit/>
           </a:bodyPr>
           <a:lstStyle/>
           <a:p>
             <a:r>
-              <a:rPr lang="en-US" sz="2400" dirty="0"/>
-              <a:t>Basic Arguments:</a:t>
+              <a:rPr lang="en-US" dirty="0"/>
+              <a:t>Basic Arguments</a:t>
             </a:r>
           </a:p>
         </p:txBody>
@@ -3317,8 +3291,8 @@
         </p:nvSpPr>
         <p:spPr>
           <a:xfrm>
-            <a:off x="5190125" y="629526"/>
-            <a:ext cx="3227553" cy="707886"/>
+            <a:off x="1137211" y="362159"/>
+            <a:ext cx="2388858" cy="523220"/>
           </a:xfrm>
           <a:prstGeom prst="rect">
             <a:avLst/>
@@ -3333,189 +3307,37 @@
           <a:p>
             <a:pPr algn="ctr"/>
             <a:r>
-              <a:rPr lang="en-US" sz="2000" dirty="0">
+              <a:rPr lang="en-US" sz="1400" dirty="0">
                 <a:latin typeface="Courier New" panose="02070309020205020404" pitchFamily="49" charset="0"/>
                 <a:cs typeface="Courier New" panose="02070309020205020404" pitchFamily="49" charset="0"/>
               </a:rPr>
               <a:t>x, n, </a:t>
             </a:r>
             <a:r>
-              <a:rPr lang="en-US" sz="2000" dirty="0" err="1">
+              <a:rPr lang="en-US" sz="1400" dirty="0" err="1">
                 <a:latin typeface="Courier New" panose="02070309020205020404" pitchFamily="49" charset="0"/>
                 <a:cs typeface="Courier New" panose="02070309020205020404" pitchFamily="49" charset="0"/>
               </a:rPr>
               <a:t>Hr</a:t>
             </a:r>
             <a:r>
-              <a:rPr lang="en-US" sz="2000" dirty="0">
+              <a:rPr lang="en-US" sz="1400" dirty="0">
                 <a:latin typeface="Courier New" panose="02070309020205020404" pitchFamily="49" charset="0"/>
                 <a:cs typeface="Courier New" panose="02070309020205020404" pitchFamily="49" charset="0"/>
               </a:rPr>
               <a:t>, a, b, </a:t>
             </a:r>
             <a:r>
-              <a:rPr lang="en-US" sz="2000" dirty="0" err="1">
+              <a:rPr lang="en-US" sz="1400" dirty="0" err="1">
                 <a:latin typeface="Courier New" panose="02070309020205020404" pitchFamily="49" charset="0"/>
                 <a:cs typeface="Courier New" panose="02070309020205020404" pitchFamily="49" charset="0"/>
               </a:rPr>
               <a:t>factor_levels</a:t>
             </a:r>
-            <a:endParaRPr lang="en-US" sz="2000" dirty="0">
+            <a:endParaRPr lang="en-US" sz="1400" dirty="0">
               <a:latin typeface="Courier New" panose="02070309020205020404" pitchFamily="49" charset="0"/>
               <a:cs typeface="Courier New" panose="02070309020205020404" pitchFamily="49" charset="0"/>
             </a:endParaRPr>
-          </a:p>
-        </p:txBody>
-      </p:sp>
-      <p:sp>
-        <p:nvSpPr>
-          <p:cNvPr id="36" name="Rounded Rectangle 35">
-            <a:extLst>
-              <a:ext uri="{FF2B5EF4-FFF2-40B4-BE49-F238E27FC236}">
-                <a16:creationId xmlns:a16="http://schemas.microsoft.com/office/drawing/2014/main" id="{ECBD4FDB-3E25-934E-B5F2-C98B6333E284}"/>
-              </a:ext>
-            </a:extLst>
-          </p:cNvPr>
-          <p:cNvSpPr/>
-          <p:nvPr/>
-        </p:nvSpPr>
-        <p:spPr>
-          <a:xfrm>
-            <a:off x="4973053" y="62874"/>
-            <a:ext cx="3571144" cy="1373934"/>
-          </a:xfrm>
-          <a:prstGeom prst="roundRect">
-            <a:avLst/>
-          </a:prstGeom>
-          <a:noFill/>
-          <a:ln w="38100"/>
-        </p:spPr>
-        <p:style>
-          <a:lnRef idx="2">
-            <a:schemeClr val="accent1">
-              <a:shade val="50000"/>
-            </a:schemeClr>
-          </a:lnRef>
-          <a:fillRef idx="1">
-            <a:schemeClr val="accent1"/>
-          </a:fillRef>
-          <a:effectRef idx="0">
-            <a:schemeClr val="accent1"/>
-          </a:effectRef>
-          <a:fontRef idx="minor">
-            <a:schemeClr val="lt1"/>
-          </a:fontRef>
-        </p:style>
-        <p:txBody>
-          <a:bodyPr rtlCol="0" anchor="ctr"/>
-          <a:lstStyle/>
-          <a:p>
-            <a:pPr algn="ctr"/>
-            <a:endParaRPr lang="en-US" sz="2520"/>
-          </a:p>
-        </p:txBody>
-      </p:sp>
-      <p:sp>
-        <p:nvSpPr>
-          <p:cNvPr id="37" name="TextBox 36">
-            <a:extLst>
-              <a:ext uri="{FF2B5EF4-FFF2-40B4-BE49-F238E27FC236}">
-                <a16:creationId xmlns:a16="http://schemas.microsoft.com/office/drawing/2014/main" id="{AA4AEB74-6F10-D94F-8DD7-4B2EF36E3D95}"/>
-              </a:ext>
-            </a:extLst>
-          </p:cNvPr>
-          <p:cNvSpPr txBox="1"/>
-          <p:nvPr/>
-        </p:nvSpPr>
-        <p:spPr>
-          <a:xfrm>
-            <a:off x="5128412" y="2109692"/>
-            <a:ext cx="1160895" cy="461665"/>
-          </a:xfrm>
-          <a:prstGeom prst="rect">
-            <a:avLst/>
-          </a:prstGeom>
-          <a:noFill/>
-        </p:spPr>
-        <p:txBody>
-          <a:bodyPr wrap="none" rtlCol="0">
-            <a:spAutoFit/>
-          </a:bodyPr>
-          <a:lstStyle/>
-          <a:p>
-            <a:r>
-              <a:rPr lang="en-US" sz="2400" dirty="0"/>
-              <a:t>Output:</a:t>
-            </a:r>
-          </a:p>
-        </p:txBody>
-      </p:sp>
-      <p:sp>
-        <p:nvSpPr>
-          <p:cNvPr id="39" name="TextBox 38">
-            <a:extLst>
-              <a:ext uri="{FF2B5EF4-FFF2-40B4-BE49-F238E27FC236}">
-                <a16:creationId xmlns:a16="http://schemas.microsoft.com/office/drawing/2014/main" id="{9AFCF3D4-07E6-5D47-8608-551F5404C13E}"/>
-              </a:ext>
-            </a:extLst>
-          </p:cNvPr>
-          <p:cNvSpPr txBox="1"/>
-          <p:nvPr/>
-        </p:nvSpPr>
-        <p:spPr>
-          <a:xfrm>
-            <a:off x="5079649" y="2520539"/>
-            <a:ext cx="3448506" cy="1323439"/>
-          </a:xfrm>
-          <a:prstGeom prst="rect">
-            <a:avLst/>
-          </a:prstGeom>
-          <a:noFill/>
-        </p:spPr>
-        <p:txBody>
-          <a:bodyPr wrap="square" rtlCol="0">
-            <a:spAutoFit/>
-          </a:bodyPr>
-          <a:lstStyle/>
-          <a:p>
-            <a:pPr marL="342900" indent="-342900">
-              <a:buFont typeface="Arial" panose="020B0604020202020204" pitchFamily="34" charset="0"/>
-              <a:buChar char="•"/>
-            </a:pPr>
-            <a:r>
-              <a:rPr lang="en-US" sz="2000" dirty="0"/>
-              <a:t>Bayes factor estimates</a:t>
-            </a:r>
-          </a:p>
-          <a:p>
-            <a:pPr marL="342900" indent="-342900">
-              <a:buFont typeface="Arial" panose="020B0604020202020204" pitchFamily="34" charset="0"/>
-              <a:buChar char="•"/>
-            </a:pPr>
-            <a:r>
-              <a:rPr lang="en-US" sz="2000" dirty="0"/>
-              <a:t>Model specifications</a:t>
-            </a:r>
-          </a:p>
-          <a:p>
-            <a:pPr marL="342900" indent="-342900">
-              <a:buFont typeface="Arial" panose="020B0604020202020204" pitchFamily="34" charset="0"/>
-              <a:buChar char="•"/>
-            </a:pPr>
-            <a:r>
-              <a:rPr lang="en-US" sz="2000" dirty="0"/>
-              <a:t>Bridge sampling output</a:t>
-            </a:r>
-          </a:p>
-          <a:p>
-            <a:pPr marL="342900" indent="-342900">
-              <a:buFont typeface="Arial" panose="020B0604020202020204" pitchFamily="34" charset="0"/>
-              <a:buChar char="•"/>
-            </a:pPr>
-            <a:r>
-              <a:rPr lang="en-US" sz="2000" dirty="0"/>
-              <a:t>Prior and posterior samples</a:t>
-            </a:r>
           </a:p>
         </p:txBody>
       </p:sp>
@@ -3533,8 +3355,8 @@
         </p:nvSpPr>
         <p:spPr>
           <a:xfrm>
-            <a:off x="485395" y="5284591"/>
-            <a:ext cx="2497751" cy="1631216"/>
+            <a:off x="1082360" y="3308445"/>
+            <a:ext cx="1816040" cy="492443"/>
           </a:xfrm>
           <a:prstGeom prst="rect">
             <a:avLst/>
@@ -3548,8 +3370,8 @@
           <a:lstStyle/>
           <a:p>
             <a:r>
-              <a:rPr lang="en-US" sz="2000" dirty="0"/>
-              <a:t>Summarizes results from Bayes factor analysis and provides posterior parameter estimates</a:t>
+              <a:rPr lang="en-US" sz="1300" dirty="0"/>
+              <a:t>Results and posterior parameter estimates</a:t>
             </a:r>
           </a:p>
         </p:txBody>
@@ -3565,15 +3387,15 @@
           </p:cNvPr>
           <p:cNvCxnSpPr>
             <a:cxnSpLocks/>
-            <a:stCxn id="36" idx="2"/>
+            <a:stCxn id="224" idx="2"/>
             <a:endCxn id="16" idx="0"/>
           </p:cNvCxnSpPr>
           <p:nvPr/>
         </p:nvCxnSpPr>
         <p:spPr>
           <a:xfrm>
-            <a:off x="6758625" y="1436808"/>
-            <a:ext cx="11843" cy="627692"/>
+            <a:off x="6916249" y="937751"/>
+            <a:ext cx="2374" cy="173552"/>
           </a:xfrm>
           <a:prstGeom prst="straightConnector1">
             <a:avLst/>
@@ -3611,8 +3433,8 @@
         </p:nvSpPr>
         <p:spPr>
           <a:xfrm>
-            <a:off x="6669571" y="4888402"/>
-            <a:ext cx="2339102" cy="400110"/>
+            <a:off x="4215589" y="3018292"/>
+            <a:ext cx="1688283" cy="307777"/>
           </a:xfrm>
           <a:prstGeom prst="rect">
             <a:avLst/>
@@ -3620,20 +3442,20 @@
           <a:noFill/>
         </p:spPr>
         <p:txBody>
-          <a:bodyPr wrap="none" rtlCol="0">
+          <a:bodyPr wrap="square" rtlCol="0">
             <a:spAutoFit/>
           </a:bodyPr>
           <a:lstStyle/>
           <a:p>
             <a:r>
-              <a:rPr lang="en-US" sz="2000" dirty="0" err="1">
+              <a:rPr lang="en-US" sz="1400" dirty="0" err="1">
                 <a:latin typeface="Courier New" panose="02070309020205020404" pitchFamily="49" charset="0"/>
                 <a:cs typeface="Courier New" panose="02070309020205020404" pitchFamily="49" charset="0"/>
               </a:rPr>
               <a:t>bayes_factor</a:t>
             </a:r>
             <a:r>
-              <a:rPr lang="en-US" sz="2000" dirty="0">
+              <a:rPr lang="en-US" sz="1400" dirty="0">
                 <a:latin typeface="Courier New" panose="02070309020205020404" pitchFamily="49" charset="0"/>
                 <a:cs typeface="Courier New" panose="02070309020205020404" pitchFamily="49" charset="0"/>
               </a:rPr>
@@ -3656,8 +3478,8 @@
         </p:nvSpPr>
         <p:spPr>
           <a:xfrm>
-            <a:off x="10250980" y="4880393"/>
-            <a:ext cx="1569660" cy="400110"/>
+            <a:off x="7526824" y="3017520"/>
+            <a:ext cx="1151277" cy="307777"/>
           </a:xfrm>
           <a:prstGeom prst="rect">
             <a:avLst/>
@@ -3665,13 +3487,13 @@
           <a:noFill/>
         </p:spPr>
         <p:txBody>
-          <a:bodyPr wrap="none" rtlCol="0">
+          <a:bodyPr wrap="square" rtlCol="0">
             <a:spAutoFit/>
           </a:bodyPr>
           <a:lstStyle/>
           <a:p>
             <a:r>
-              <a:rPr lang="en-US" sz="2000" dirty="0">
+              <a:rPr lang="en-US" sz="1400" dirty="0">
                 <a:latin typeface="Courier New" panose="02070309020205020404" pitchFamily="49" charset="0"/>
                 <a:cs typeface="Courier New" panose="02070309020205020404" pitchFamily="49" charset="0"/>
               </a:rPr>
@@ -3680,193 +3502,6 @@
           </a:p>
         </p:txBody>
       </p:sp>
-      <p:sp>
-        <p:nvSpPr>
-          <p:cNvPr id="64" name="Rounded Rectangle 63">
-            <a:extLst>
-              <a:ext uri="{FF2B5EF4-FFF2-40B4-BE49-F238E27FC236}">
-                <a16:creationId xmlns:a16="http://schemas.microsoft.com/office/drawing/2014/main" id="{01E590AB-D74C-1E4A-B00D-084C92591E3F}"/>
-              </a:ext>
-            </a:extLst>
-          </p:cNvPr>
-          <p:cNvSpPr/>
-          <p:nvPr/>
-        </p:nvSpPr>
-        <p:spPr>
-          <a:xfrm>
-            <a:off x="3472116" y="4748470"/>
-            <a:ext cx="2809382" cy="2409768"/>
-          </a:xfrm>
-          <a:prstGeom prst="roundRect">
-            <a:avLst/>
-          </a:prstGeom>
-          <a:noFill/>
-          <a:ln w="38100"/>
-        </p:spPr>
-        <p:style>
-          <a:lnRef idx="2">
-            <a:schemeClr val="accent1">
-              <a:shade val="50000"/>
-            </a:schemeClr>
-          </a:lnRef>
-          <a:fillRef idx="1">
-            <a:schemeClr val="accent1"/>
-          </a:fillRef>
-          <a:effectRef idx="0">
-            <a:schemeClr val="accent1"/>
-          </a:effectRef>
-          <a:fontRef idx="minor">
-            <a:schemeClr val="lt1"/>
-          </a:fontRef>
-        </p:style>
-        <p:txBody>
-          <a:bodyPr rtlCol="0" anchor="ctr"/>
-          <a:lstStyle/>
-          <a:p>
-            <a:pPr algn="ctr"/>
-            <a:endParaRPr lang="en-US" sz="2520" dirty="0"/>
-          </a:p>
-        </p:txBody>
-      </p:sp>
-      <p:sp>
-        <p:nvSpPr>
-          <p:cNvPr id="65" name="Rounded Rectangle 64">
-            <a:extLst>
-              <a:ext uri="{FF2B5EF4-FFF2-40B4-BE49-F238E27FC236}">
-                <a16:creationId xmlns:a16="http://schemas.microsoft.com/office/drawing/2014/main" id="{0A26B9DE-E2FF-8049-B6F2-D897C6C17676}"/>
-              </a:ext>
-            </a:extLst>
-          </p:cNvPr>
-          <p:cNvSpPr/>
-          <p:nvPr/>
-        </p:nvSpPr>
-        <p:spPr>
-          <a:xfrm>
-            <a:off x="6599367" y="4806487"/>
-            <a:ext cx="2809382" cy="2409768"/>
-          </a:xfrm>
-          <a:prstGeom prst="roundRect">
-            <a:avLst/>
-          </a:prstGeom>
-          <a:noFill/>
-          <a:ln w="38100"/>
-        </p:spPr>
-        <p:style>
-          <a:lnRef idx="2">
-            <a:schemeClr val="accent1">
-              <a:shade val="50000"/>
-            </a:schemeClr>
-          </a:lnRef>
-          <a:fillRef idx="1">
-            <a:schemeClr val="accent1"/>
-          </a:fillRef>
-          <a:effectRef idx="0">
-            <a:schemeClr val="accent1"/>
-          </a:effectRef>
-          <a:fontRef idx="minor">
-            <a:schemeClr val="lt1"/>
-          </a:fontRef>
-        </p:style>
-        <p:txBody>
-          <a:bodyPr rtlCol="0" anchor="ctr"/>
-          <a:lstStyle/>
-          <a:p>
-            <a:pPr algn="ctr"/>
-            <a:endParaRPr lang="en-US" sz="2520" dirty="0"/>
-          </a:p>
-        </p:txBody>
-      </p:sp>
-      <p:sp>
-        <p:nvSpPr>
-          <p:cNvPr id="66" name="Rounded Rectangle 65">
-            <a:extLst>
-              <a:ext uri="{FF2B5EF4-FFF2-40B4-BE49-F238E27FC236}">
-                <a16:creationId xmlns:a16="http://schemas.microsoft.com/office/drawing/2014/main" id="{2B14A6D7-EA71-1840-9897-A9EBEECC52F6}"/>
-              </a:ext>
-            </a:extLst>
-          </p:cNvPr>
-          <p:cNvSpPr/>
-          <p:nvPr/>
-        </p:nvSpPr>
-        <p:spPr>
-          <a:xfrm>
-            <a:off x="9877307" y="4806486"/>
-            <a:ext cx="2809382" cy="2409768"/>
-          </a:xfrm>
-          <a:prstGeom prst="roundRect">
-            <a:avLst/>
-          </a:prstGeom>
-          <a:noFill/>
-          <a:ln w="38100"/>
-        </p:spPr>
-        <p:style>
-          <a:lnRef idx="2">
-            <a:schemeClr val="accent1">
-              <a:shade val="50000"/>
-            </a:schemeClr>
-          </a:lnRef>
-          <a:fillRef idx="1">
-            <a:schemeClr val="accent1"/>
-          </a:fillRef>
-          <a:effectRef idx="0">
-            <a:schemeClr val="accent1"/>
-          </a:effectRef>
-          <a:fontRef idx="minor">
-            <a:schemeClr val="lt1"/>
-          </a:fontRef>
-        </p:style>
-        <p:txBody>
-          <a:bodyPr rtlCol="0" anchor="ctr"/>
-          <a:lstStyle/>
-          <a:p>
-            <a:pPr algn="ctr"/>
-            <a:endParaRPr lang="en-US" sz="2520" dirty="0"/>
-          </a:p>
-        </p:txBody>
-      </p:sp>
-      <p:cxnSp>
-        <p:nvCxnSpPr>
-          <p:cNvPr id="67" name="Straight Arrow Connector 66">
-            <a:extLst>
-              <a:ext uri="{FF2B5EF4-FFF2-40B4-BE49-F238E27FC236}">
-                <a16:creationId xmlns:a16="http://schemas.microsoft.com/office/drawing/2014/main" id="{C1F7768E-E185-D040-AD05-A3CCE4067213}"/>
-              </a:ext>
-            </a:extLst>
-          </p:cNvPr>
-          <p:cNvCxnSpPr>
-            <a:cxnSpLocks/>
-            <a:stCxn id="16" idx="2"/>
-            <a:endCxn id="64" idx="0"/>
-          </p:cNvCxnSpPr>
-          <p:nvPr/>
-        </p:nvCxnSpPr>
-        <p:spPr>
-          <a:xfrm flipH="1">
-            <a:off x="4876807" y="4013067"/>
-            <a:ext cx="1893661" cy="735403"/>
-          </a:xfrm>
-          <a:prstGeom prst="straightConnector1">
-            <a:avLst/>
-          </a:prstGeom>
-          <a:ln w="38100">
-            <a:tailEnd type="triangle"/>
-          </a:ln>
-        </p:spPr>
-        <p:style>
-          <a:lnRef idx="1">
-            <a:schemeClr val="accent1"/>
-          </a:lnRef>
-          <a:fillRef idx="0">
-            <a:schemeClr val="accent1"/>
-          </a:fillRef>
-          <a:effectRef idx="0">
-            <a:schemeClr val="accent1"/>
-          </a:effectRef>
-          <a:fontRef idx="minor">
-            <a:schemeClr val="tx1"/>
-          </a:fontRef>
-        </p:style>
-      </p:cxnSp>
       <p:cxnSp>
         <p:nvCxnSpPr>
           <p:cNvPr id="75" name="Straight Arrow Connector 74">
@@ -3879,14 +3514,14 @@
           <p:cNvCxnSpPr>
             <a:cxnSpLocks/>
             <a:stCxn id="16" idx="2"/>
-            <a:endCxn id="66" idx="0"/>
+            <a:endCxn id="229" idx="0"/>
           </p:cNvCxnSpPr>
           <p:nvPr/>
         </p:nvCxnSpPr>
         <p:spPr>
           <a:xfrm>
-            <a:off x="6770468" y="4013067"/>
-            <a:ext cx="4511530" cy="793419"/>
+            <a:off x="6918623" y="2098252"/>
+            <a:ext cx="1257778" cy="507788"/>
           </a:xfrm>
           <a:prstGeom prst="straightConnector1">
             <a:avLst/>
@@ -3922,14 +3557,14 @@
           <p:cNvCxnSpPr>
             <a:cxnSpLocks/>
             <a:stCxn id="16" idx="2"/>
-            <a:endCxn id="65" idx="0"/>
+            <a:endCxn id="228" idx="0"/>
           </p:cNvCxnSpPr>
           <p:nvPr/>
         </p:nvCxnSpPr>
         <p:spPr>
-          <a:xfrm>
-            <a:off x="6770468" y="4013067"/>
-            <a:ext cx="1233590" cy="793420"/>
+          <a:xfrm flipH="1">
+            <a:off x="5037506" y="2098252"/>
+            <a:ext cx="1881117" cy="507788"/>
           </a:xfrm>
           <a:prstGeom prst="straightConnector1">
             <a:avLst/>
@@ -3967,8 +3602,8 @@
         </p:nvSpPr>
         <p:spPr>
           <a:xfrm>
-            <a:off x="3556703" y="5284591"/>
-            <a:ext cx="2913688" cy="1631216"/>
+            <a:off x="1125409" y="6054976"/>
+            <a:ext cx="2166897" cy="892552"/>
           </a:xfrm>
           <a:prstGeom prst="rect">
             <a:avLst/>
@@ -3982,20 +3617,8 @@
           <a:lstStyle/>
           <a:p>
             <a:r>
-              <a:rPr lang="en-US" sz="2000" dirty="0"/>
-              <a:t>Plots the posterior </a:t>
-            </a:r>
-          </a:p>
-          <a:p>
-            <a:r>
-              <a:rPr lang="en-US" sz="2000" dirty="0"/>
-              <a:t>median and credible interval of the </a:t>
-            </a:r>
-          </a:p>
-          <a:p>
-            <a:r>
-              <a:rPr lang="en-US" sz="2000" dirty="0"/>
-              <a:t>parameter estimates of the encompassing model </a:t>
+              <a:rPr lang="en-US" sz="1300" dirty="0"/>
+              <a:t>Posterior median and credible interval of marginal densities under encompassing model </a:t>
             </a:r>
           </a:p>
         </p:txBody>
@@ -4014,8 +3637,8 @@
         </p:nvSpPr>
         <p:spPr>
           <a:xfrm>
-            <a:off x="6697926" y="5262526"/>
-            <a:ext cx="2789753" cy="1015663"/>
+            <a:off x="4297190" y="3302919"/>
+            <a:ext cx="1860522" cy="492443"/>
           </a:xfrm>
           <a:prstGeom prst="rect">
             <a:avLst/>
@@ -4029,18 +3652,109 @@
           <a:lstStyle/>
           <a:p>
             <a:r>
-              <a:rPr lang="en-US" sz="2000" dirty="0"/>
-              <a:t>Extracts information about computed Bayes factors</a:t>
-            </a:r>
-          </a:p>
-        </p:txBody>
-      </p:sp>
-      <p:sp>
-        <p:nvSpPr>
-          <p:cNvPr id="93" name="TextBox 92">
+              <a:rPr lang="en-US" sz="1300" dirty="0"/>
+              <a:t>Information about computed Bayes factors</a:t>
+            </a:r>
+          </a:p>
+        </p:txBody>
+      </p:sp>
+      <p:sp>
+        <p:nvSpPr>
+          <p:cNvPr id="62" name="Rounded Rectangle 61">
             <a:extLst>
               <a:ext uri="{FF2B5EF4-FFF2-40B4-BE49-F238E27FC236}">
-                <a16:creationId xmlns:a16="http://schemas.microsoft.com/office/drawing/2014/main" id="{EE9574CE-5687-CD44-B1A2-25DD350FD746}"/>
+                <a16:creationId xmlns:a16="http://schemas.microsoft.com/office/drawing/2014/main" id="{78292592-14DF-A849-9108-FEB815BE0869}"/>
+              </a:ext>
+            </a:extLst>
+          </p:cNvPr>
+          <p:cNvSpPr/>
+          <p:nvPr/>
+        </p:nvSpPr>
+        <p:spPr>
+          <a:xfrm>
+            <a:off x="1023809" y="18765"/>
+            <a:ext cx="2731119" cy="990816"/>
+          </a:xfrm>
+          <a:prstGeom prst="roundRect">
+            <a:avLst/>
+          </a:prstGeom>
+          <a:noFill/>
+          <a:ln w="38100"/>
+        </p:spPr>
+        <p:style>
+          <a:lnRef idx="2">
+            <a:schemeClr val="accent1">
+              <a:shade val="50000"/>
+            </a:schemeClr>
+          </a:lnRef>
+          <a:fillRef idx="1">
+            <a:schemeClr val="accent1"/>
+          </a:fillRef>
+          <a:effectRef idx="0">
+            <a:schemeClr val="accent1"/>
+          </a:effectRef>
+          <a:fontRef idx="minor">
+            <a:schemeClr val="lt1"/>
+          </a:fontRef>
+        </p:style>
+        <p:txBody>
+          <a:bodyPr rtlCol="0" anchor="ctr"/>
+          <a:lstStyle/>
+          <a:p>
+            <a:pPr algn="ctr"/>
+            <a:endParaRPr lang="en-US" sz="2520" dirty="0"/>
+          </a:p>
+        </p:txBody>
+      </p:sp>
+      <p:cxnSp>
+        <p:nvCxnSpPr>
+          <p:cNvPr id="52" name="Straight Arrow Connector 51">
+            <a:extLst>
+              <a:ext uri="{FF2B5EF4-FFF2-40B4-BE49-F238E27FC236}">
+                <a16:creationId xmlns:a16="http://schemas.microsoft.com/office/drawing/2014/main" id="{6D528652-3B79-C644-B1DC-7339C985D507}"/>
+              </a:ext>
+            </a:extLst>
+          </p:cNvPr>
+          <p:cNvCxnSpPr>
+            <a:cxnSpLocks/>
+            <a:stCxn id="62" idx="3"/>
+            <a:endCxn id="224" idx="1"/>
+          </p:cNvCxnSpPr>
+          <p:nvPr/>
+        </p:nvCxnSpPr>
+        <p:spPr>
+          <a:xfrm flipV="1">
+            <a:off x="3754928" y="483389"/>
+            <a:ext cx="1684211" cy="30784"/>
+          </a:xfrm>
+          <a:prstGeom prst="straightConnector1">
+            <a:avLst/>
+          </a:prstGeom>
+          <a:ln w="38100">
+            <a:tailEnd type="triangle"/>
+          </a:ln>
+        </p:spPr>
+        <p:style>
+          <a:lnRef idx="1">
+            <a:schemeClr val="accent1"/>
+          </a:lnRef>
+          <a:fillRef idx="0">
+            <a:schemeClr val="accent1"/>
+          </a:fillRef>
+          <a:effectRef idx="0">
+            <a:schemeClr val="accent1"/>
+          </a:effectRef>
+          <a:fontRef idx="minor">
+            <a:schemeClr val="tx1"/>
+          </a:fontRef>
+        </p:style>
+      </p:cxnSp>
+      <p:sp>
+        <p:nvSpPr>
+          <p:cNvPr id="76" name="TextBox 75">
+            <a:extLst>
+              <a:ext uri="{FF2B5EF4-FFF2-40B4-BE49-F238E27FC236}">
+                <a16:creationId xmlns:a16="http://schemas.microsoft.com/office/drawing/2014/main" id="{C710710A-090E-4A44-B56F-D924815F332D}"/>
               </a:ext>
             </a:extLst>
           </p:cNvPr>
@@ -4049,13 +3763,20 @@
         </p:nvSpPr>
         <p:spPr>
           <a:xfrm>
-            <a:off x="8519307" y="1688731"/>
-            <a:ext cx="2800767" cy="400110"/>
+            <a:off x="1633148" y="4642527"/>
+            <a:ext cx="482824" cy="292388"/>
           </a:xfrm>
           <a:prstGeom prst="rect">
             <a:avLst/>
           </a:prstGeom>
           <a:noFill/>
+          <a:ln w="19050">
+            <a:solidFill>
+              <a:schemeClr val="accent1">
+                <a:shade val="50000"/>
+              </a:schemeClr>
+            </a:solidFill>
+          </a:ln>
         </p:spPr>
         <p:txBody>
           <a:bodyPr wrap="none" rtlCol="0">
@@ -4064,14 +3785,289 @@
           <a:lstStyle/>
           <a:p>
             <a:r>
-              <a:rPr lang="en-US" sz="2000" dirty="0" err="1">
+              <a:rPr lang="en-US" sz="1300" dirty="0">
                 <a:latin typeface="Courier New" panose="02070309020205020404" pitchFamily="49" charset="0"/>
                 <a:cs typeface="Courier New" panose="02070309020205020404" pitchFamily="49" charset="0"/>
               </a:rPr>
-              <a:t>binomBfInformed</a:t>
-            </a:r>
-            <a:r>
-              <a:rPr lang="en-US" sz="2000" dirty="0">
+              <a:t>$bf</a:t>
+            </a:r>
+          </a:p>
+        </p:txBody>
+      </p:sp>
+      <p:sp>
+        <p:nvSpPr>
+          <p:cNvPr id="77" name="TextBox 76">
+            <a:extLst>
+              <a:ext uri="{FF2B5EF4-FFF2-40B4-BE49-F238E27FC236}">
+                <a16:creationId xmlns:a16="http://schemas.microsoft.com/office/drawing/2014/main" id="{800B983C-9424-0348-B5B2-DEE4DC33793A}"/>
+              </a:ext>
+            </a:extLst>
+          </p:cNvPr>
+          <p:cNvSpPr txBox="1"/>
+          <p:nvPr/>
+        </p:nvSpPr>
+        <p:spPr>
+          <a:xfrm>
+            <a:off x="5046412" y="1708403"/>
+            <a:ext cx="1688283" cy="307777"/>
+          </a:xfrm>
+          <a:prstGeom prst="rect">
+            <a:avLst/>
+          </a:prstGeom>
+          <a:noFill/>
+          <a:ln w="19050">
+            <a:solidFill>
+              <a:schemeClr val="accent1"/>
+            </a:solidFill>
+          </a:ln>
+        </p:spPr>
+        <p:txBody>
+          <a:bodyPr wrap="none" rtlCol="0">
+            <a:spAutoFit/>
+          </a:bodyPr>
+          <a:lstStyle/>
+          <a:p>
+            <a:r>
+              <a:rPr lang="en-US" sz="1400" dirty="0">
+                <a:latin typeface="Courier New" panose="02070309020205020404" pitchFamily="49" charset="0"/>
+                <a:cs typeface="Courier New" panose="02070309020205020404" pitchFamily="49" charset="0"/>
+              </a:rPr>
+              <a:t>$</a:t>
+            </a:r>
+            <a:r>
+              <a:rPr lang="en-US" sz="1400" dirty="0" err="1">
+                <a:latin typeface="Courier New" panose="02070309020205020404" pitchFamily="49" charset="0"/>
+                <a:cs typeface="Courier New" panose="02070309020205020404" pitchFamily="49" charset="0"/>
+              </a:rPr>
+              <a:t>bridge_output</a:t>
+            </a:r>
+            <a:endParaRPr lang="en-US" sz="1400" dirty="0">
+              <a:latin typeface="Courier New" panose="02070309020205020404" pitchFamily="49" charset="0"/>
+              <a:cs typeface="Courier New" panose="02070309020205020404" pitchFamily="49" charset="0"/>
+            </a:endParaRPr>
+          </a:p>
+        </p:txBody>
+      </p:sp>
+      <p:sp>
+        <p:nvSpPr>
+          <p:cNvPr id="78" name="TextBox 77">
+            <a:extLst>
+              <a:ext uri="{FF2B5EF4-FFF2-40B4-BE49-F238E27FC236}">
+                <a16:creationId xmlns:a16="http://schemas.microsoft.com/office/drawing/2014/main" id="{2318F166-C8A8-7B46-A9A6-02E939A554EE}"/>
+              </a:ext>
+            </a:extLst>
+          </p:cNvPr>
+          <p:cNvSpPr txBox="1"/>
+          <p:nvPr/>
+        </p:nvSpPr>
+        <p:spPr>
+          <a:xfrm>
+            <a:off x="4755955" y="1295067"/>
+            <a:ext cx="1043876" cy="307777"/>
+          </a:xfrm>
+          <a:prstGeom prst="rect">
+            <a:avLst/>
+          </a:prstGeom>
+          <a:noFill/>
+          <a:ln w="19050">
+            <a:solidFill>
+              <a:schemeClr val="accent1"/>
+            </a:solidFill>
+          </a:ln>
+        </p:spPr>
+        <p:txBody>
+          <a:bodyPr wrap="none" rtlCol="0">
+            <a:spAutoFit/>
+          </a:bodyPr>
+          <a:lstStyle/>
+          <a:p>
+            <a:r>
+              <a:rPr lang="en-US" sz="1400" dirty="0">
+                <a:latin typeface="Courier New" panose="02070309020205020404" pitchFamily="49" charset="0"/>
+                <a:cs typeface="Courier New" panose="02070309020205020404" pitchFamily="49" charset="0"/>
+              </a:rPr>
+              <a:t>$</a:t>
+            </a:r>
+            <a:r>
+              <a:rPr lang="en-US" sz="1400" dirty="0" err="1">
+                <a:latin typeface="Courier New" panose="02070309020205020404" pitchFamily="49" charset="0"/>
+                <a:cs typeface="Courier New" panose="02070309020205020404" pitchFamily="49" charset="0"/>
+              </a:rPr>
+              <a:t>bf_list</a:t>
+            </a:r>
+            <a:endParaRPr lang="en-US" sz="1400" dirty="0">
+              <a:latin typeface="Courier New" panose="02070309020205020404" pitchFamily="49" charset="0"/>
+              <a:cs typeface="Courier New" panose="02070309020205020404" pitchFamily="49" charset="0"/>
+            </a:endParaRPr>
+          </a:p>
+        </p:txBody>
+      </p:sp>
+      <p:sp>
+        <p:nvSpPr>
+          <p:cNvPr id="80" name="TextBox 79">
+            <a:extLst>
+              <a:ext uri="{FF2B5EF4-FFF2-40B4-BE49-F238E27FC236}">
+                <a16:creationId xmlns:a16="http://schemas.microsoft.com/office/drawing/2014/main" id="{12BA7A21-C6DC-BD4B-9864-99F1E165AE06}"/>
+              </a:ext>
+            </a:extLst>
+          </p:cNvPr>
+          <p:cNvSpPr txBox="1"/>
+          <p:nvPr/>
+        </p:nvSpPr>
+        <p:spPr>
+          <a:xfrm>
+            <a:off x="7540469" y="1293291"/>
+            <a:ext cx="1580882" cy="307777"/>
+          </a:xfrm>
+          <a:prstGeom prst="rect">
+            <a:avLst/>
+          </a:prstGeom>
+          <a:noFill/>
+          <a:ln w="19050">
+            <a:solidFill>
+              <a:schemeClr val="accent1"/>
+            </a:solidFill>
+          </a:ln>
+        </p:spPr>
+        <p:txBody>
+          <a:bodyPr wrap="none" rtlCol="0">
+            <a:spAutoFit/>
+          </a:bodyPr>
+          <a:lstStyle/>
+          <a:p>
+            <a:r>
+              <a:rPr lang="en-US" sz="1400" dirty="0">
+                <a:latin typeface="Courier New" panose="02070309020205020404" pitchFamily="49" charset="0"/>
+                <a:cs typeface="Courier New" panose="02070309020205020404" pitchFamily="49" charset="0"/>
+              </a:rPr>
+              <a:t>$restrictions</a:t>
+            </a:r>
+          </a:p>
+        </p:txBody>
+      </p:sp>
+      <p:sp>
+        <p:nvSpPr>
+          <p:cNvPr id="81" name="TextBox 80">
+            <a:extLst>
+              <a:ext uri="{FF2B5EF4-FFF2-40B4-BE49-F238E27FC236}">
+                <a16:creationId xmlns:a16="http://schemas.microsoft.com/office/drawing/2014/main" id="{BDF333D9-2260-454C-B341-BD34F954011C}"/>
+              </a:ext>
+            </a:extLst>
+          </p:cNvPr>
+          <p:cNvSpPr txBox="1"/>
+          <p:nvPr/>
+        </p:nvSpPr>
+        <p:spPr>
+          <a:xfrm>
+            <a:off x="6917436" y="1695771"/>
+            <a:ext cx="1043876" cy="307777"/>
+          </a:xfrm>
+          <a:prstGeom prst="rect">
+            <a:avLst/>
+          </a:prstGeom>
+          <a:noFill/>
+          <a:ln w="19050">
+            <a:solidFill>
+              <a:schemeClr val="accent1"/>
+            </a:solidFill>
+          </a:ln>
+        </p:spPr>
+        <p:txBody>
+          <a:bodyPr wrap="none" rtlCol="0">
+            <a:spAutoFit/>
+          </a:bodyPr>
+          <a:lstStyle/>
+          <a:p>
+            <a:r>
+              <a:rPr lang="en-US" sz="1400" dirty="0">
+                <a:latin typeface="Courier New" panose="02070309020205020404" pitchFamily="49" charset="0"/>
+                <a:cs typeface="Courier New" panose="02070309020205020404" pitchFamily="49" charset="0"/>
+              </a:rPr>
+              <a:t>$samples</a:t>
+            </a:r>
+          </a:p>
+        </p:txBody>
+      </p:sp>
+      <p:cxnSp>
+        <p:nvCxnSpPr>
+          <p:cNvPr id="108" name="Straight Arrow Connector 107">
+            <a:extLst>
+              <a:ext uri="{FF2B5EF4-FFF2-40B4-BE49-F238E27FC236}">
+                <a16:creationId xmlns:a16="http://schemas.microsoft.com/office/drawing/2014/main" id="{E63D330D-805E-844E-9220-5F6DCF6C1909}"/>
+              </a:ext>
+            </a:extLst>
+          </p:cNvPr>
+          <p:cNvCxnSpPr>
+            <a:cxnSpLocks/>
+            <a:stCxn id="16" idx="2"/>
+            <a:endCxn id="230" idx="0"/>
+          </p:cNvCxnSpPr>
+          <p:nvPr/>
+        </p:nvCxnSpPr>
+        <p:spPr>
+          <a:xfrm>
+            <a:off x="6918623" y="2098252"/>
+            <a:ext cx="4364587" cy="505987"/>
+          </a:xfrm>
+          <a:prstGeom prst="straightConnector1">
+            <a:avLst/>
+          </a:prstGeom>
+          <a:ln w="38100">
+            <a:tailEnd type="triangle"/>
+          </a:ln>
+        </p:spPr>
+        <p:style>
+          <a:lnRef idx="1">
+            <a:schemeClr val="accent1"/>
+          </a:lnRef>
+          <a:fillRef idx="0">
+            <a:schemeClr val="accent1"/>
+          </a:fillRef>
+          <a:effectRef idx="0">
+            <a:schemeClr val="accent1"/>
+          </a:effectRef>
+          <a:fontRef idx="minor">
+            <a:schemeClr val="tx1"/>
+          </a:fontRef>
+        </p:style>
+      </p:cxnSp>
+      <p:sp>
+        <p:nvSpPr>
+          <p:cNvPr id="111" name="TextBox 110">
+            <a:extLst>
+              <a:ext uri="{FF2B5EF4-FFF2-40B4-BE49-F238E27FC236}">
+                <a16:creationId xmlns:a16="http://schemas.microsoft.com/office/drawing/2014/main" id="{DE0E08C6-CD58-F446-BA56-7A2704FEBF6A}"/>
+              </a:ext>
+            </a:extLst>
+          </p:cNvPr>
+          <p:cNvSpPr txBox="1"/>
+          <p:nvPr/>
+        </p:nvSpPr>
+        <p:spPr>
+          <a:xfrm>
+            <a:off x="10558143" y="3017520"/>
+            <a:ext cx="1770373" cy="307777"/>
+          </a:xfrm>
+          <a:prstGeom prst="rect">
+            <a:avLst/>
+          </a:prstGeom>
+          <a:noFill/>
+        </p:spPr>
+        <p:txBody>
+          <a:bodyPr wrap="square" rtlCol="0">
+            <a:spAutoFit/>
+          </a:bodyPr>
+          <a:lstStyle/>
+          <a:p>
+            <a:r>
+              <a:rPr lang="en-US" sz="1400" dirty="0" err="1">
+                <a:latin typeface="Courier New" panose="02070309020205020404" pitchFamily="49" charset="0"/>
+                <a:cs typeface="Courier New" panose="02070309020205020404" pitchFamily="49" charset="0"/>
+              </a:rPr>
+              <a:t>bridge_ouput</a:t>
+            </a:r>
+            <a:r>
+              <a:rPr lang="en-US" sz="1400" dirty="0">
                 <a:latin typeface="Courier New" panose="02070309020205020404" pitchFamily="49" charset="0"/>
                 <a:cs typeface="Courier New" panose="02070309020205020404" pitchFamily="49" charset="0"/>
               </a:rPr>
@@ -4080,6 +4076,1488 @@
           </a:p>
         </p:txBody>
       </p:sp>
+      <p:sp>
+        <p:nvSpPr>
+          <p:cNvPr id="112" name="TextBox 111">
+            <a:extLst>
+              <a:ext uri="{FF2B5EF4-FFF2-40B4-BE49-F238E27FC236}">
+                <a16:creationId xmlns:a16="http://schemas.microsoft.com/office/drawing/2014/main" id="{6EFFC9F9-63AC-1F4F-AD85-BB918557776D}"/>
+              </a:ext>
+            </a:extLst>
+          </p:cNvPr>
+          <p:cNvSpPr txBox="1"/>
+          <p:nvPr/>
+        </p:nvSpPr>
+        <p:spPr>
+          <a:xfrm>
+            <a:off x="10558143" y="3302092"/>
+            <a:ext cx="1770367" cy="492443"/>
+          </a:xfrm>
+          <a:prstGeom prst="rect">
+            <a:avLst/>
+          </a:prstGeom>
+          <a:noFill/>
+        </p:spPr>
+        <p:txBody>
+          <a:bodyPr wrap="square" rtlCol="0">
+            <a:spAutoFit/>
+          </a:bodyPr>
+          <a:lstStyle/>
+          <a:p>
+            <a:r>
+              <a:rPr lang="en-US" sz="1300" dirty="0"/>
+              <a:t>Bridge sampling output and error measures</a:t>
+            </a:r>
+          </a:p>
+        </p:txBody>
+      </p:sp>
+      <p:sp>
+        <p:nvSpPr>
+          <p:cNvPr id="121" name="TextBox 120">
+            <a:extLst>
+              <a:ext uri="{FF2B5EF4-FFF2-40B4-BE49-F238E27FC236}">
+                <a16:creationId xmlns:a16="http://schemas.microsoft.com/office/drawing/2014/main" id="{720C9F1E-3C18-444A-906F-F1BEA499BA51}"/>
+              </a:ext>
+            </a:extLst>
+          </p:cNvPr>
+          <p:cNvSpPr txBox="1"/>
+          <p:nvPr/>
+        </p:nvSpPr>
+        <p:spPr>
+          <a:xfrm>
+            <a:off x="5987110" y="1293291"/>
+            <a:ext cx="1366080" cy="307777"/>
+          </a:xfrm>
+          <a:prstGeom prst="rect">
+            <a:avLst/>
+          </a:prstGeom>
+          <a:noFill/>
+          <a:ln w="19050">
+            <a:solidFill>
+              <a:schemeClr val="accent1"/>
+            </a:solidFill>
+          </a:ln>
+        </p:spPr>
+        <p:txBody>
+          <a:bodyPr wrap="none" rtlCol="0">
+            <a:spAutoFit/>
+          </a:bodyPr>
+          <a:lstStyle/>
+          <a:p>
+            <a:r>
+              <a:rPr lang="en-US" sz="1400" dirty="0">
+                <a:latin typeface="Courier New" panose="02070309020205020404" pitchFamily="49" charset="0"/>
+                <a:cs typeface="Courier New" panose="02070309020205020404" pitchFamily="49" charset="0"/>
+              </a:rPr>
+              <a:t>$</a:t>
+            </a:r>
+            <a:r>
+              <a:rPr lang="en-US" sz="1400" dirty="0" err="1">
+                <a:latin typeface="Courier New" panose="02070309020205020404" pitchFamily="49" charset="0"/>
+                <a:cs typeface="Courier New" panose="02070309020205020404" pitchFamily="49" charset="0"/>
+              </a:rPr>
+              <a:t>cred_level</a:t>
+            </a:r>
+            <a:endParaRPr lang="en-US" sz="1400" dirty="0">
+              <a:latin typeface="Courier New" panose="02070309020205020404" pitchFamily="49" charset="0"/>
+              <a:cs typeface="Courier New" panose="02070309020205020404" pitchFamily="49" charset="0"/>
+            </a:endParaRPr>
+          </a:p>
+        </p:txBody>
+      </p:sp>
+      <p:sp>
+        <p:nvSpPr>
+          <p:cNvPr id="168" name="Rounded Rectangle 167">
+            <a:extLst>
+              <a:ext uri="{FF2B5EF4-FFF2-40B4-BE49-F238E27FC236}">
+                <a16:creationId xmlns:a16="http://schemas.microsoft.com/office/drawing/2014/main" id="{40A82EF3-E1B8-1D47-9E64-1FE76061A729}"/>
+              </a:ext>
+            </a:extLst>
+          </p:cNvPr>
+          <p:cNvSpPr/>
+          <p:nvPr/>
+        </p:nvSpPr>
+        <p:spPr>
+          <a:xfrm>
+            <a:off x="461423" y="4547902"/>
+            <a:ext cx="2927558" cy="843905"/>
+          </a:xfrm>
+          <a:prstGeom prst="roundRect">
+            <a:avLst/>
+          </a:prstGeom>
+          <a:noFill/>
+          <a:ln w="38100"/>
+        </p:spPr>
+        <p:style>
+          <a:lnRef idx="2">
+            <a:schemeClr val="accent1">
+              <a:shade val="50000"/>
+            </a:schemeClr>
+          </a:lnRef>
+          <a:fillRef idx="1">
+            <a:schemeClr val="accent1"/>
+          </a:fillRef>
+          <a:effectRef idx="0">
+            <a:schemeClr val="accent1"/>
+          </a:effectRef>
+          <a:fontRef idx="minor">
+            <a:schemeClr val="lt1"/>
+          </a:fontRef>
+        </p:style>
+        <p:txBody>
+          <a:bodyPr rtlCol="0" anchor="ctr"/>
+          <a:lstStyle/>
+          <a:p>
+            <a:pPr algn="ctr"/>
+            <a:endParaRPr lang="en-US" sz="2520" dirty="0"/>
+          </a:p>
+        </p:txBody>
+      </p:sp>
+      <p:cxnSp>
+        <p:nvCxnSpPr>
+          <p:cNvPr id="171" name="Straight Arrow Connector 170">
+            <a:extLst>
+              <a:ext uri="{FF2B5EF4-FFF2-40B4-BE49-F238E27FC236}">
+                <a16:creationId xmlns:a16="http://schemas.microsoft.com/office/drawing/2014/main" id="{6FE63E81-7833-D741-808B-05861382F7CB}"/>
+              </a:ext>
+            </a:extLst>
+          </p:cNvPr>
+          <p:cNvCxnSpPr>
+            <a:cxnSpLocks/>
+            <a:stCxn id="227" idx="2"/>
+            <a:endCxn id="168" idx="0"/>
+          </p:cNvCxnSpPr>
+          <p:nvPr/>
+        </p:nvCxnSpPr>
+        <p:spPr>
+          <a:xfrm flipH="1">
+            <a:off x="1925202" y="4312913"/>
+            <a:ext cx="4135" cy="234989"/>
+          </a:xfrm>
+          <a:prstGeom prst="straightConnector1">
+            <a:avLst/>
+          </a:prstGeom>
+          <a:ln w="38100">
+            <a:tailEnd type="triangle"/>
+          </a:ln>
+        </p:spPr>
+        <p:style>
+          <a:lnRef idx="1">
+            <a:schemeClr val="accent1"/>
+          </a:lnRef>
+          <a:fillRef idx="0">
+            <a:schemeClr val="accent1"/>
+          </a:fillRef>
+          <a:effectRef idx="0">
+            <a:schemeClr val="accent1"/>
+          </a:effectRef>
+          <a:fontRef idx="minor">
+            <a:schemeClr val="tx1"/>
+          </a:fontRef>
+        </p:style>
+      </p:cxnSp>
+      <p:cxnSp>
+        <p:nvCxnSpPr>
+          <p:cNvPr id="186" name="Straight Arrow Connector 185">
+            <a:extLst>
+              <a:ext uri="{FF2B5EF4-FFF2-40B4-BE49-F238E27FC236}">
+                <a16:creationId xmlns:a16="http://schemas.microsoft.com/office/drawing/2014/main" id="{216F2E31-0C85-0644-8956-92F44F21D041}"/>
+              </a:ext>
+            </a:extLst>
+          </p:cNvPr>
+          <p:cNvCxnSpPr>
+            <a:cxnSpLocks/>
+            <a:stCxn id="168" idx="2"/>
+            <a:endCxn id="231" idx="0"/>
+          </p:cNvCxnSpPr>
+          <p:nvPr/>
+        </p:nvCxnSpPr>
+        <p:spPr>
+          <a:xfrm flipH="1">
+            <a:off x="1923692" y="5391807"/>
+            <a:ext cx="1510" cy="303650"/>
+          </a:xfrm>
+          <a:prstGeom prst="straightConnector1">
+            <a:avLst/>
+          </a:prstGeom>
+          <a:ln w="38100">
+            <a:tailEnd type="triangle"/>
+          </a:ln>
+        </p:spPr>
+        <p:style>
+          <a:lnRef idx="1">
+            <a:schemeClr val="accent1"/>
+          </a:lnRef>
+          <a:fillRef idx="0">
+            <a:schemeClr val="accent1"/>
+          </a:fillRef>
+          <a:effectRef idx="0">
+            <a:schemeClr val="accent1"/>
+          </a:effectRef>
+          <a:fontRef idx="minor">
+            <a:schemeClr val="tx1"/>
+          </a:fontRef>
+        </p:style>
+      </p:cxnSp>
+      <p:cxnSp>
+        <p:nvCxnSpPr>
+          <p:cNvPr id="191" name="Straight Arrow Connector 190">
+            <a:extLst>
+              <a:ext uri="{FF2B5EF4-FFF2-40B4-BE49-F238E27FC236}">
+                <a16:creationId xmlns:a16="http://schemas.microsoft.com/office/drawing/2014/main" id="{BECE3FB3-3DD3-F045-B40F-5692E688AFFB}"/>
+              </a:ext>
+            </a:extLst>
+          </p:cNvPr>
+          <p:cNvCxnSpPr>
+            <a:cxnSpLocks/>
+            <a:stCxn id="230" idx="2"/>
+            <a:endCxn id="268" idx="0"/>
+          </p:cNvCxnSpPr>
+          <p:nvPr/>
+        </p:nvCxnSpPr>
+        <p:spPr>
+          <a:xfrm>
+            <a:off x="11283210" y="4311112"/>
+            <a:ext cx="5137" cy="234580"/>
+          </a:xfrm>
+          <a:prstGeom prst="straightConnector1">
+            <a:avLst/>
+          </a:prstGeom>
+          <a:ln w="38100">
+            <a:tailEnd type="triangle"/>
+          </a:ln>
+        </p:spPr>
+        <p:style>
+          <a:lnRef idx="1">
+            <a:schemeClr val="accent1"/>
+          </a:lnRef>
+          <a:fillRef idx="0">
+            <a:schemeClr val="accent1"/>
+          </a:fillRef>
+          <a:effectRef idx="0">
+            <a:schemeClr val="accent1"/>
+          </a:effectRef>
+          <a:fontRef idx="minor">
+            <a:schemeClr val="tx1"/>
+          </a:fontRef>
+        </p:style>
+      </p:cxnSp>
+      <p:sp>
+        <p:nvSpPr>
+          <p:cNvPr id="224" name="Diamond 223">
+            <a:extLst>
+              <a:ext uri="{FF2B5EF4-FFF2-40B4-BE49-F238E27FC236}">
+                <a16:creationId xmlns:a16="http://schemas.microsoft.com/office/drawing/2014/main" id="{57AFD143-7A16-A84A-8BC0-1121CBB0ECCC}"/>
+              </a:ext>
+            </a:extLst>
+          </p:cNvPr>
+          <p:cNvSpPr/>
+          <p:nvPr/>
+        </p:nvSpPr>
+        <p:spPr>
+          <a:xfrm>
+            <a:off x="5439139" y="29026"/>
+            <a:ext cx="2954219" cy="908725"/>
+          </a:xfrm>
+          <a:prstGeom prst="diamond">
+            <a:avLst/>
+          </a:prstGeom>
+          <a:noFill/>
+          <a:ln w="38100"/>
+        </p:spPr>
+        <p:style>
+          <a:lnRef idx="2">
+            <a:schemeClr val="accent1">
+              <a:shade val="50000"/>
+            </a:schemeClr>
+          </a:lnRef>
+          <a:fillRef idx="1">
+            <a:schemeClr val="accent1"/>
+          </a:fillRef>
+          <a:effectRef idx="0">
+            <a:schemeClr val="accent1"/>
+          </a:effectRef>
+          <a:fontRef idx="minor">
+            <a:schemeClr val="lt1"/>
+          </a:fontRef>
+        </p:style>
+        <p:txBody>
+          <a:bodyPr rtlCol="0" anchor="ctr"/>
+          <a:lstStyle/>
+          <a:p>
+            <a:pPr algn="ctr"/>
+            <a:endParaRPr lang="en-US"/>
+          </a:p>
+        </p:txBody>
+      </p:sp>
+      <p:sp>
+        <p:nvSpPr>
+          <p:cNvPr id="227" name="Diamond 226">
+            <a:extLst>
+              <a:ext uri="{FF2B5EF4-FFF2-40B4-BE49-F238E27FC236}">
+                <a16:creationId xmlns:a16="http://schemas.microsoft.com/office/drawing/2014/main" id="{209270F7-BDA0-554A-B924-3F203BAB73A6}"/>
+              </a:ext>
+            </a:extLst>
+          </p:cNvPr>
+          <p:cNvSpPr/>
+          <p:nvPr/>
+        </p:nvSpPr>
+        <p:spPr>
+          <a:xfrm>
+            <a:off x="461422" y="2606040"/>
+            <a:ext cx="2935829" cy="1706873"/>
+          </a:xfrm>
+          <a:prstGeom prst="diamond">
+            <a:avLst/>
+          </a:prstGeom>
+          <a:noFill/>
+          <a:ln w="38100"/>
+        </p:spPr>
+        <p:style>
+          <a:lnRef idx="2">
+            <a:schemeClr val="accent1">
+              <a:shade val="50000"/>
+            </a:schemeClr>
+          </a:lnRef>
+          <a:fillRef idx="1">
+            <a:schemeClr val="accent1"/>
+          </a:fillRef>
+          <a:effectRef idx="0">
+            <a:schemeClr val="accent1"/>
+          </a:effectRef>
+          <a:fontRef idx="minor">
+            <a:schemeClr val="lt1"/>
+          </a:fontRef>
+        </p:style>
+        <p:txBody>
+          <a:bodyPr rtlCol="0" anchor="ctr"/>
+          <a:lstStyle/>
+          <a:p>
+            <a:pPr algn="ctr"/>
+            <a:endParaRPr lang="en-US"/>
+          </a:p>
+        </p:txBody>
+      </p:sp>
+      <p:sp>
+        <p:nvSpPr>
+          <p:cNvPr id="228" name="Diamond 227">
+            <a:extLst>
+              <a:ext uri="{FF2B5EF4-FFF2-40B4-BE49-F238E27FC236}">
+                <a16:creationId xmlns:a16="http://schemas.microsoft.com/office/drawing/2014/main" id="{21BEA04D-21C7-8E4E-BD4E-669B8F2B096C}"/>
+              </a:ext>
+            </a:extLst>
+          </p:cNvPr>
+          <p:cNvSpPr/>
+          <p:nvPr/>
+        </p:nvSpPr>
+        <p:spPr>
+          <a:xfrm>
+            <a:off x="3569591" y="2606040"/>
+            <a:ext cx="2935829" cy="1706873"/>
+          </a:xfrm>
+          <a:prstGeom prst="diamond">
+            <a:avLst/>
+          </a:prstGeom>
+          <a:noFill/>
+          <a:ln w="38100"/>
+        </p:spPr>
+        <p:style>
+          <a:lnRef idx="2">
+            <a:schemeClr val="accent1">
+              <a:shade val="50000"/>
+            </a:schemeClr>
+          </a:lnRef>
+          <a:fillRef idx="1">
+            <a:schemeClr val="accent1"/>
+          </a:fillRef>
+          <a:effectRef idx="0">
+            <a:schemeClr val="accent1"/>
+          </a:effectRef>
+          <a:fontRef idx="minor">
+            <a:schemeClr val="lt1"/>
+          </a:fontRef>
+        </p:style>
+        <p:txBody>
+          <a:bodyPr rtlCol="0" anchor="ctr"/>
+          <a:lstStyle/>
+          <a:p>
+            <a:pPr algn="ctr"/>
+            <a:endParaRPr lang="en-US"/>
+          </a:p>
+        </p:txBody>
+      </p:sp>
+      <p:sp>
+        <p:nvSpPr>
+          <p:cNvPr id="229" name="Diamond 228">
+            <a:extLst>
+              <a:ext uri="{FF2B5EF4-FFF2-40B4-BE49-F238E27FC236}">
+                <a16:creationId xmlns:a16="http://schemas.microsoft.com/office/drawing/2014/main" id="{30C3EB57-C315-BC49-8B72-63C073C2629C}"/>
+              </a:ext>
+            </a:extLst>
+          </p:cNvPr>
+          <p:cNvSpPr/>
+          <p:nvPr/>
+        </p:nvSpPr>
+        <p:spPr>
+          <a:xfrm>
+            <a:off x="6708486" y="2606040"/>
+            <a:ext cx="2935829" cy="1706873"/>
+          </a:xfrm>
+          <a:prstGeom prst="diamond">
+            <a:avLst/>
+          </a:prstGeom>
+          <a:noFill/>
+          <a:ln w="38100"/>
+        </p:spPr>
+        <p:style>
+          <a:lnRef idx="2">
+            <a:schemeClr val="accent1">
+              <a:shade val="50000"/>
+            </a:schemeClr>
+          </a:lnRef>
+          <a:fillRef idx="1">
+            <a:schemeClr val="accent1"/>
+          </a:fillRef>
+          <a:effectRef idx="0">
+            <a:schemeClr val="accent1"/>
+          </a:effectRef>
+          <a:fontRef idx="minor">
+            <a:schemeClr val="lt1"/>
+          </a:fontRef>
+        </p:style>
+        <p:txBody>
+          <a:bodyPr rtlCol="0" anchor="ctr"/>
+          <a:lstStyle/>
+          <a:p>
+            <a:pPr algn="ctr"/>
+            <a:endParaRPr lang="en-US"/>
+          </a:p>
+        </p:txBody>
+      </p:sp>
+      <p:sp>
+        <p:nvSpPr>
+          <p:cNvPr id="230" name="Diamond 229">
+            <a:extLst>
+              <a:ext uri="{FF2B5EF4-FFF2-40B4-BE49-F238E27FC236}">
+                <a16:creationId xmlns:a16="http://schemas.microsoft.com/office/drawing/2014/main" id="{3B5AAA9D-0B9A-354C-91FF-CE916CBDAFFC}"/>
+              </a:ext>
+            </a:extLst>
+          </p:cNvPr>
+          <p:cNvSpPr/>
+          <p:nvPr/>
+        </p:nvSpPr>
+        <p:spPr>
+          <a:xfrm>
+            <a:off x="9815295" y="2604239"/>
+            <a:ext cx="2935829" cy="1706873"/>
+          </a:xfrm>
+          <a:prstGeom prst="diamond">
+            <a:avLst/>
+          </a:prstGeom>
+          <a:noFill/>
+          <a:ln w="38100"/>
+        </p:spPr>
+        <p:style>
+          <a:lnRef idx="2">
+            <a:schemeClr val="accent1">
+              <a:shade val="50000"/>
+            </a:schemeClr>
+          </a:lnRef>
+          <a:fillRef idx="1">
+            <a:schemeClr val="accent1"/>
+          </a:fillRef>
+          <a:effectRef idx="0">
+            <a:schemeClr val="accent1"/>
+          </a:effectRef>
+          <a:fontRef idx="minor">
+            <a:schemeClr val="lt1"/>
+          </a:fontRef>
+        </p:style>
+        <p:txBody>
+          <a:bodyPr rtlCol="0" anchor="ctr"/>
+          <a:lstStyle/>
+          <a:p>
+            <a:pPr algn="ctr"/>
+            <a:endParaRPr lang="en-US" b="1" dirty="0"/>
+          </a:p>
+        </p:txBody>
+      </p:sp>
+      <p:sp>
+        <p:nvSpPr>
+          <p:cNvPr id="231" name="Diamond 230">
+            <a:extLst>
+              <a:ext uri="{FF2B5EF4-FFF2-40B4-BE49-F238E27FC236}">
+                <a16:creationId xmlns:a16="http://schemas.microsoft.com/office/drawing/2014/main" id="{813A4897-8239-514E-B47A-B69370F31771}"/>
+              </a:ext>
+            </a:extLst>
+          </p:cNvPr>
+          <p:cNvSpPr/>
+          <p:nvPr/>
+        </p:nvSpPr>
+        <p:spPr>
+          <a:xfrm>
+            <a:off x="277792" y="5695457"/>
+            <a:ext cx="3291799" cy="1576381"/>
+          </a:xfrm>
+          <a:prstGeom prst="diamond">
+            <a:avLst/>
+          </a:prstGeom>
+          <a:noFill/>
+          <a:ln w="38100"/>
+        </p:spPr>
+        <p:style>
+          <a:lnRef idx="2">
+            <a:schemeClr val="accent1">
+              <a:shade val="50000"/>
+            </a:schemeClr>
+          </a:lnRef>
+          <a:fillRef idx="1">
+            <a:schemeClr val="accent1"/>
+          </a:fillRef>
+          <a:effectRef idx="0">
+            <a:schemeClr val="accent1"/>
+          </a:effectRef>
+          <a:fontRef idx="minor">
+            <a:schemeClr val="lt1"/>
+          </a:fontRef>
+        </p:style>
+        <p:txBody>
+          <a:bodyPr rtlCol="0" anchor="ctr"/>
+          <a:lstStyle/>
+          <a:p>
+            <a:pPr algn="ctr"/>
+            <a:endParaRPr lang="en-US"/>
+          </a:p>
+        </p:txBody>
+      </p:sp>
+      <p:sp>
+        <p:nvSpPr>
+          <p:cNvPr id="259" name="TextBox 258">
+            <a:extLst>
+              <a:ext uri="{FF2B5EF4-FFF2-40B4-BE49-F238E27FC236}">
+                <a16:creationId xmlns:a16="http://schemas.microsoft.com/office/drawing/2014/main" id="{DBCE4272-3B9F-214D-925E-7E67C7347446}"/>
+              </a:ext>
+            </a:extLst>
+          </p:cNvPr>
+          <p:cNvSpPr txBox="1"/>
+          <p:nvPr/>
+        </p:nvSpPr>
+        <p:spPr>
+          <a:xfrm>
+            <a:off x="933214" y="4634190"/>
+            <a:ext cx="582211" cy="292388"/>
+          </a:xfrm>
+          <a:prstGeom prst="rect">
+            <a:avLst/>
+          </a:prstGeom>
+          <a:noFill/>
+          <a:ln w="19050">
+            <a:solidFill>
+              <a:schemeClr val="accent1">
+                <a:shade val="50000"/>
+              </a:schemeClr>
+            </a:solidFill>
+          </a:ln>
+        </p:spPr>
+        <p:txBody>
+          <a:bodyPr wrap="none" rtlCol="0">
+            <a:spAutoFit/>
+          </a:bodyPr>
+          <a:lstStyle/>
+          <a:p>
+            <a:r>
+              <a:rPr lang="en-US" sz="1300" dirty="0">
+                <a:latin typeface="Courier New" panose="02070309020205020404" pitchFamily="49" charset="0"/>
+                <a:cs typeface="Courier New" panose="02070309020205020404" pitchFamily="49" charset="0"/>
+              </a:rPr>
+              <a:t>$</a:t>
+            </a:r>
+            <a:r>
+              <a:rPr lang="en-US" sz="1300" dirty="0" err="1">
+                <a:latin typeface="Courier New" panose="02070309020205020404" pitchFamily="49" charset="0"/>
+                <a:cs typeface="Courier New" panose="02070309020205020404" pitchFamily="49" charset="0"/>
+              </a:rPr>
+              <a:t>hyp</a:t>
+            </a:r>
+            <a:endParaRPr lang="en-US" sz="1300" dirty="0">
+              <a:latin typeface="Courier New" panose="02070309020205020404" pitchFamily="49" charset="0"/>
+              <a:cs typeface="Courier New" panose="02070309020205020404" pitchFamily="49" charset="0"/>
+            </a:endParaRPr>
+          </a:p>
+        </p:txBody>
+      </p:sp>
+      <p:sp>
+        <p:nvSpPr>
+          <p:cNvPr id="260" name="TextBox 259">
+            <a:extLst>
+              <a:ext uri="{FF2B5EF4-FFF2-40B4-BE49-F238E27FC236}">
+                <a16:creationId xmlns:a16="http://schemas.microsoft.com/office/drawing/2014/main" id="{A6B9B02F-BD27-DB41-8BEE-72D946401979}"/>
+              </a:ext>
+            </a:extLst>
+          </p:cNvPr>
+          <p:cNvSpPr txBox="1"/>
+          <p:nvPr/>
+        </p:nvSpPr>
+        <p:spPr>
+          <a:xfrm>
+            <a:off x="621448" y="5012865"/>
+            <a:ext cx="1277914" cy="292388"/>
+          </a:xfrm>
+          <a:prstGeom prst="rect">
+            <a:avLst/>
+          </a:prstGeom>
+          <a:noFill/>
+          <a:ln w="19050">
+            <a:solidFill>
+              <a:schemeClr val="accent1">
+                <a:shade val="50000"/>
+              </a:schemeClr>
+            </a:solidFill>
+          </a:ln>
+        </p:spPr>
+        <p:txBody>
+          <a:bodyPr wrap="none" rtlCol="0">
+            <a:spAutoFit/>
+          </a:bodyPr>
+          <a:lstStyle/>
+          <a:p>
+            <a:r>
+              <a:rPr lang="en-US" sz="1300" dirty="0">
+                <a:latin typeface="Courier New" panose="02070309020205020404" pitchFamily="49" charset="0"/>
+                <a:cs typeface="Courier New" panose="02070309020205020404" pitchFamily="49" charset="0"/>
+              </a:rPr>
+              <a:t>$</a:t>
+            </a:r>
+            <a:r>
+              <a:rPr lang="en-US" sz="1300" dirty="0" err="1">
+                <a:latin typeface="Courier New" panose="02070309020205020404" pitchFamily="49" charset="0"/>
+                <a:cs typeface="Courier New" panose="02070309020205020404" pitchFamily="49" charset="0"/>
+              </a:rPr>
+              <a:t>cred_level</a:t>
+            </a:r>
+            <a:endParaRPr lang="en-US" sz="1300" dirty="0">
+              <a:latin typeface="Courier New" panose="02070309020205020404" pitchFamily="49" charset="0"/>
+              <a:cs typeface="Courier New" panose="02070309020205020404" pitchFamily="49" charset="0"/>
+            </a:endParaRPr>
+          </a:p>
+        </p:txBody>
+      </p:sp>
+      <p:sp>
+        <p:nvSpPr>
+          <p:cNvPr id="261" name="TextBox 260">
+            <a:extLst>
+              <a:ext uri="{FF2B5EF4-FFF2-40B4-BE49-F238E27FC236}">
+                <a16:creationId xmlns:a16="http://schemas.microsoft.com/office/drawing/2014/main" id="{3442C8E9-4DBF-904B-B2F8-1D951E0C040C}"/>
+              </a:ext>
+            </a:extLst>
+          </p:cNvPr>
+          <p:cNvSpPr txBox="1"/>
+          <p:nvPr/>
+        </p:nvSpPr>
+        <p:spPr>
+          <a:xfrm>
+            <a:off x="2206288" y="4647929"/>
+            <a:ext cx="979755" cy="292388"/>
+          </a:xfrm>
+          <a:prstGeom prst="rect">
+            <a:avLst/>
+          </a:prstGeom>
+          <a:noFill/>
+          <a:ln w="19050">
+            <a:solidFill>
+              <a:schemeClr val="accent1">
+                <a:shade val="50000"/>
+              </a:schemeClr>
+            </a:solidFill>
+          </a:ln>
+        </p:spPr>
+        <p:txBody>
+          <a:bodyPr wrap="none" rtlCol="0">
+            <a:spAutoFit/>
+          </a:bodyPr>
+          <a:lstStyle/>
+          <a:p>
+            <a:r>
+              <a:rPr lang="en-US" sz="1300" dirty="0">
+                <a:latin typeface="Courier New" panose="02070309020205020404" pitchFamily="49" charset="0"/>
+                <a:cs typeface="Courier New" panose="02070309020205020404" pitchFamily="49" charset="0"/>
+              </a:rPr>
+              <a:t>$</a:t>
+            </a:r>
+            <a:r>
+              <a:rPr lang="en-US" sz="1300" dirty="0" err="1">
+                <a:latin typeface="Courier New" panose="02070309020205020404" pitchFamily="49" charset="0"/>
+                <a:cs typeface="Courier New" panose="02070309020205020404" pitchFamily="49" charset="0"/>
+              </a:rPr>
+              <a:t>bf_type</a:t>
+            </a:r>
+            <a:endParaRPr lang="en-US" sz="1300" dirty="0">
+              <a:latin typeface="Courier New" panose="02070309020205020404" pitchFamily="49" charset="0"/>
+              <a:cs typeface="Courier New" panose="02070309020205020404" pitchFamily="49" charset="0"/>
+            </a:endParaRPr>
+          </a:p>
+        </p:txBody>
+      </p:sp>
+      <p:sp>
+        <p:nvSpPr>
+          <p:cNvPr id="262" name="TextBox 261">
+            <a:extLst>
+              <a:ext uri="{FF2B5EF4-FFF2-40B4-BE49-F238E27FC236}">
+                <a16:creationId xmlns:a16="http://schemas.microsoft.com/office/drawing/2014/main" id="{80499D10-4568-E644-ADEB-563F95B92BB3}"/>
+              </a:ext>
+            </a:extLst>
+          </p:cNvPr>
+          <p:cNvSpPr txBox="1"/>
+          <p:nvPr/>
+        </p:nvSpPr>
+        <p:spPr>
+          <a:xfrm>
+            <a:off x="1987160" y="5019232"/>
+            <a:ext cx="1178528" cy="292388"/>
+          </a:xfrm>
+          <a:prstGeom prst="rect">
+            <a:avLst/>
+          </a:prstGeom>
+          <a:noFill/>
+          <a:ln w="19050">
+            <a:solidFill>
+              <a:schemeClr val="accent1">
+                <a:shade val="50000"/>
+              </a:schemeClr>
+            </a:solidFill>
+          </a:ln>
+        </p:spPr>
+        <p:txBody>
+          <a:bodyPr wrap="none" rtlCol="0">
+            <a:spAutoFit/>
+          </a:bodyPr>
+          <a:lstStyle/>
+          <a:p>
+            <a:r>
+              <a:rPr lang="en-US" sz="1300" dirty="0">
+                <a:latin typeface="Courier New" panose="02070309020205020404" pitchFamily="49" charset="0"/>
+                <a:cs typeface="Courier New" panose="02070309020205020404" pitchFamily="49" charset="0"/>
+              </a:rPr>
+              <a:t>$estimates</a:t>
+            </a:r>
+          </a:p>
+        </p:txBody>
+      </p:sp>
+      <p:sp>
+        <p:nvSpPr>
+          <p:cNvPr id="267" name="TextBox 266">
+            <a:extLst>
+              <a:ext uri="{FF2B5EF4-FFF2-40B4-BE49-F238E27FC236}">
+                <a16:creationId xmlns:a16="http://schemas.microsoft.com/office/drawing/2014/main" id="{5D29AFB6-4FD0-3747-BA11-DDF0775C186B}"/>
+              </a:ext>
+            </a:extLst>
+          </p:cNvPr>
+          <p:cNvSpPr txBox="1"/>
+          <p:nvPr/>
+        </p:nvSpPr>
+        <p:spPr>
+          <a:xfrm>
+            <a:off x="10843267" y="4640317"/>
+            <a:ext cx="780983" cy="292388"/>
+          </a:xfrm>
+          <a:prstGeom prst="rect">
+            <a:avLst/>
+          </a:prstGeom>
+          <a:noFill/>
+          <a:ln w="19050">
+            <a:solidFill>
+              <a:schemeClr val="accent1">
+                <a:shade val="50000"/>
+              </a:schemeClr>
+            </a:solidFill>
+          </a:ln>
+        </p:spPr>
+        <p:txBody>
+          <a:bodyPr wrap="none" rtlCol="0">
+            <a:spAutoFit/>
+          </a:bodyPr>
+          <a:lstStyle/>
+          <a:p>
+            <a:r>
+              <a:rPr lang="en-US" sz="1300" dirty="0">
+                <a:latin typeface="Courier New" panose="02070309020205020404" pitchFamily="49" charset="0"/>
+                <a:cs typeface="Courier New" panose="02070309020205020404" pitchFamily="49" charset="0"/>
+              </a:rPr>
+              <a:t>$niter</a:t>
+            </a:r>
+          </a:p>
+        </p:txBody>
+      </p:sp>
+      <p:sp>
+        <p:nvSpPr>
+          <p:cNvPr id="268" name="Rounded Rectangle 267">
+            <a:extLst>
+              <a:ext uri="{FF2B5EF4-FFF2-40B4-BE49-F238E27FC236}">
+                <a16:creationId xmlns:a16="http://schemas.microsoft.com/office/drawing/2014/main" id="{6A63EF4A-A841-4F46-AC38-2ADC748464BE}"/>
+              </a:ext>
+            </a:extLst>
+          </p:cNvPr>
+          <p:cNvSpPr/>
+          <p:nvPr/>
+        </p:nvSpPr>
+        <p:spPr>
+          <a:xfrm>
+            <a:off x="9872035" y="4545692"/>
+            <a:ext cx="2832623" cy="843905"/>
+          </a:xfrm>
+          <a:prstGeom prst="roundRect">
+            <a:avLst/>
+          </a:prstGeom>
+          <a:noFill/>
+          <a:ln w="38100"/>
+        </p:spPr>
+        <p:style>
+          <a:lnRef idx="2">
+            <a:schemeClr val="accent1">
+              <a:shade val="50000"/>
+            </a:schemeClr>
+          </a:lnRef>
+          <a:fillRef idx="1">
+            <a:schemeClr val="accent1"/>
+          </a:fillRef>
+          <a:effectRef idx="0">
+            <a:schemeClr val="accent1"/>
+          </a:effectRef>
+          <a:fontRef idx="minor">
+            <a:schemeClr val="lt1"/>
+          </a:fontRef>
+        </p:style>
+        <p:txBody>
+          <a:bodyPr rtlCol="0" anchor="ctr"/>
+          <a:lstStyle/>
+          <a:p>
+            <a:pPr algn="ctr"/>
+            <a:endParaRPr lang="en-US" sz="2520" dirty="0"/>
+          </a:p>
+        </p:txBody>
+      </p:sp>
+      <p:sp>
+        <p:nvSpPr>
+          <p:cNvPr id="269" name="TextBox 268">
+            <a:extLst>
+              <a:ext uri="{FF2B5EF4-FFF2-40B4-BE49-F238E27FC236}">
+                <a16:creationId xmlns:a16="http://schemas.microsoft.com/office/drawing/2014/main" id="{75D8961C-7DC6-0F4E-AE20-4E59E70DA821}"/>
+              </a:ext>
+            </a:extLst>
+          </p:cNvPr>
+          <p:cNvSpPr txBox="1"/>
+          <p:nvPr/>
+        </p:nvSpPr>
+        <p:spPr>
+          <a:xfrm>
+            <a:off x="10025113" y="4622547"/>
+            <a:ext cx="681597" cy="292388"/>
+          </a:xfrm>
+          <a:prstGeom prst="rect">
+            <a:avLst/>
+          </a:prstGeom>
+          <a:noFill/>
+          <a:ln w="19050">
+            <a:solidFill>
+              <a:schemeClr val="accent1">
+                <a:shade val="50000"/>
+              </a:schemeClr>
+            </a:solidFill>
+          </a:ln>
+        </p:spPr>
+        <p:txBody>
+          <a:bodyPr wrap="none" rtlCol="0">
+            <a:spAutoFit/>
+          </a:bodyPr>
+          <a:lstStyle/>
+          <a:p>
+            <a:r>
+              <a:rPr lang="en-US" sz="1300" dirty="0">
+                <a:latin typeface="Courier New" panose="02070309020205020404" pitchFamily="49" charset="0"/>
+                <a:cs typeface="Courier New" panose="02070309020205020404" pitchFamily="49" charset="0"/>
+              </a:rPr>
+              <a:t>$eval</a:t>
+            </a:r>
+          </a:p>
+        </p:txBody>
+      </p:sp>
+      <p:sp>
+        <p:nvSpPr>
+          <p:cNvPr id="270" name="TextBox 269">
+            <a:extLst>
+              <a:ext uri="{FF2B5EF4-FFF2-40B4-BE49-F238E27FC236}">
+                <a16:creationId xmlns:a16="http://schemas.microsoft.com/office/drawing/2014/main" id="{67E96E20-8CB1-A141-B750-02CF1C6E4F7B}"/>
+              </a:ext>
+            </a:extLst>
+          </p:cNvPr>
+          <p:cNvSpPr txBox="1"/>
+          <p:nvPr/>
+        </p:nvSpPr>
+        <p:spPr>
+          <a:xfrm>
+            <a:off x="10052282" y="5010655"/>
+            <a:ext cx="582211" cy="292388"/>
+          </a:xfrm>
+          <a:prstGeom prst="rect">
+            <a:avLst/>
+          </a:prstGeom>
+          <a:noFill/>
+          <a:ln w="19050">
+            <a:solidFill>
+              <a:schemeClr val="accent1">
+                <a:shade val="50000"/>
+              </a:schemeClr>
+            </a:solidFill>
+          </a:ln>
+        </p:spPr>
+        <p:txBody>
+          <a:bodyPr wrap="none" rtlCol="0">
+            <a:spAutoFit/>
+          </a:bodyPr>
+          <a:lstStyle/>
+          <a:p>
+            <a:r>
+              <a:rPr lang="en-US" sz="1300" dirty="0">
+                <a:latin typeface="Courier New" panose="02070309020205020404" pitchFamily="49" charset="0"/>
+                <a:cs typeface="Courier New" panose="02070309020205020404" pitchFamily="49" charset="0"/>
+              </a:rPr>
+              <a:t>$</a:t>
+            </a:r>
+            <a:r>
+              <a:rPr lang="en-US" sz="1300" dirty="0" err="1">
+                <a:latin typeface="Courier New" panose="02070309020205020404" pitchFamily="49" charset="0"/>
+                <a:cs typeface="Courier New" panose="02070309020205020404" pitchFamily="49" charset="0"/>
+              </a:rPr>
+              <a:t>hyp</a:t>
+            </a:r>
+            <a:endParaRPr lang="en-US" sz="1300" dirty="0">
+              <a:latin typeface="Courier New" panose="02070309020205020404" pitchFamily="49" charset="0"/>
+              <a:cs typeface="Courier New" panose="02070309020205020404" pitchFamily="49" charset="0"/>
+            </a:endParaRPr>
+          </a:p>
+        </p:txBody>
+      </p:sp>
+      <p:sp>
+        <p:nvSpPr>
+          <p:cNvPr id="271" name="TextBox 270">
+            <a:extLst>
+              <a:ext uri="{FF2B5EF4-FFF2-40B4-BE49-F238E27FC236}">
+                <a16:creationId xmlns:a16="http://schemas.microsoft.com/office/drawing/2014/main" id="{2297FBA3-2B29-1540-9DDE-D46F6AC321A5}"/>
+              </a:ext>
+            </a:extLst>
+          </p:cNvPr>
+          <p:cNvSpPr txBox="1"/>
+          <p:nvPr/>
+        </p:nvSpPr>
+        <p:spPr>
+          <a:xfrm>
+            <a:off x="11742226" y="4645719"/>
+            <a:ext cx="780983" cy="292388"/>
+          </a:xfrm>
+          <a:prstGeom prst="rect">
+            <a:avLst/>
+          </a:prstGeom>
+          <a:noFill/>
+          <a:ln w="19050">
+            <a:solidFill>
+              <a:schemeClr val="accent1">
+                <a:shade val="50000"/>
+              </a:schemeClr>
+            </a:solidFill>
+          </a:ln>
+        </p:spPr>
+        <p:txBody>
+          <a:bodyPr wrap="none" rtlCol="0">
+            <a:spAutoFit/>
+          </a:bodyPr>
+          <a:lstStyle/>
+          <a:p>
+            <a:r>
+              <a:rPr lang="en-US" sz="1300" dirty="0">
+                <a:latin typeface="Courier New" panose="02070309020205020404" pitchFamily="49" charset="0"/>
+                <a:cs typeface="Courier New" panose="02070309020205020404" pitchFamily="49" charset="0"/>
+              </a:rPr>
+              <a:t>$</a:t>
+            </a:r>
+            <a:r>
+              <a:rPr lang="en-US" sz="1300" dirty="0" err="1">
+                <a:latin typeface="Courier New" panose="02070309020205020404" pitchFamily="49" charset="0"/>
+                <a:cs typeface="Courier New" panose="02070309020205020404" pitchFamily="49" charset="0"/>
+              </a:rPr>
+              <a:t>logml</a:t>
+            </a:r>
+            <a:endParaRPr lang="en-US" sz="1300" dirty="0">
+              <a:latin typeface="Courier New" panose="02070309020205020404" pitchFamily="49" charset="0"/>
+              <a:cs typeface="Courier New" panose="02070309020205020404" pitchFamily="49" charset="0"/>
+            </a:endParaRPr>
+          </a:p>
+        </p:txBody>
+      </p:sp>
+      <p:sp>
+        <p:nvSpPr>
+          <p:cNvPr id="272" name="TextBox 271">
+            <a:extLst>
+              <a:ext uri="{FF2B5EF4-FFF2-40B4-BE49-F238E27FC236}">
+                <a16:creationId xmlns:a16="http://schemas.microsoft.com/office/drawing/2014/main" id="{CB2699B5-7D4A-764B-82AE-A83B01ABB0AC}"/>
+              </a:ext>
+            </a:extLst>
+          </p:cNvPr>
+          <p:cNvSpPr txBox="1"/>
+          <p:nvPr/>
+        </p:nvSpPr>
+        <p:spPr>
+          <a:xfrm>
+            <a:off x="10745336" y="5006512"/>
+            <a:ext cx="1675459" cy="292388"/>
+          </a:xfrm>
+          <a:prstGeom prst="rect">
+            <a:avLst/>
+          </a:prstGeom>
+          <a:noFill/>
+          <a:ln w="19050">
+            <a:solidFill>
+              <a:schemeClr val="accent1">
+                <a:shade val="50000"/>
+              </a:schemeClr>
+            </a:solidFill>
+          </a:ln>
+        </p:spPr>
+        <p:txBody>
+          <a:bodyPr wrap="none" rtlCol="0">
+            <a:spAutoFit/>
+          </a:bodyPr>
+          <a:lstStyle/>
+          <a:p>
+            <a:r>
+              <a:rPr lang="en-US" sz="1300" dirty="0">
+                <a:latin typeface="Courier New" panose="02070309020205020404" pitchFamily="49" charset="0"/>
+                <a:cs typeface="Courier New" panose="02070309020205020404" pitchFamily="49" charset="0"/>
+              </a:rPr>
+              <a:t>$</a:t>
+            </a:r>
+            <a:r>
+              <a:rPr lang="en-US" sz="1300" dirty="0" err="1">
+                <a:latin typeface="Courier New" panose="02070309020205020404" pitchFamily="49" charset="0"/>
+                <a:cs typeface="Courier New" panose="02070309020205020404" pitchFamily="49" charset="0"/>
+              </a:rPr>
+              <a:t>error_measures</a:t>
+            </a:r>
+            <a:endParaRPr lang="en-US" sz="1300" dirty="0">
+              <a:latin typeface="Courier New" panose="02070309020205020404" pitchFamily="49" charset="0"/>
+              <a:cs typeface="Courier New" panose="02070309020205020404" pitchFamily="49" charset="0"/>
+            </a:endParaRPr>
+          </a:p>
+        </p:txBody>
+      </p:sp>
+      <p:sp>
+        <p:nvSpPr>
+          <p:cNvPr id="283" name="Rounded Rectangle 282">
+            <a:extLst>
+              <a:ext uri="{FF2B5EF4-FFF2-40B4-BE49-F238E27FC236}">
+                <a16:creationId xmlns:a16="http://schemas.microsoft.com/office/drawing/2014/main" id="{162171C2-56DF-7546-9CD5-2C5E75FA2D96}"/>
+              </a:ext>
+            </a:extLst>
+          </p:cNvPr>
+          <p:cNvSpPr/>
+          <p:nvPr/>
+        </p:nvSpPr>
+        <p:spPr>
+          <a:xfrm>
+            <a:off x="4081075" y="4545692"/>
+            <a:ext cx="1914636" cy="843905"/>
+          </a:xfrm>
+          <a:prstGeom prst="roundRect">
+            <a:avLst/>
+          </a:prstGeom>
+          <a:noFill/>
+          <a:ln w="38100"/>
+        </p:spPr>
+        <p:style>
+          <a:lnRef idx="2">
+            <a:schemeClr val="accent1">
+              <a:shade val="50000"/>
+            </a:schemeClr>
+          </a:lnRef>
+          <a:fillRef idx="1">
+            <a:schemeClr val="accent1"/>
+          </a:fillRef>
+          <a:effectRef idx="0">
+            <a:schemeClr val="accent1"/>
+          </a:effectRef>
+          <a:fontRef idx="minor">
+            <a:schemeClr val="lt1"/>
+          </a:fontRef>
+        </p:style>
+        <p:txBody>
+          <a:bodyPr rtlCol="0" anchor="ctr"/>
+          <a:lstStyle/>
+          <a:p>
+            <a:pPr algn="ctr"/>
+            <a:endParaRPr lang="en-US" sz="2520" dirty="0"/>
+          </a:p>
+        </p:txBody>
+      </p:sp>
+      <p:sp>
+        <p:nvSpPr>
+          <p:cNvPr id="285" name="TextBox 284">
+            <a:extLst>
+              <a:ext uri="{FF2B5EF4-FFF2-40B4-BE49-F238E27FC236}">
+                <a16:creationId xmlns:a16="http://schemas.microsoft.com/office/drawing/2014/main" id="{DCD3999A-8D6A-BB4A-AE4C-4DE261228E6F}"/>
+              </a:ext>
+            </a:extLst>
+          </p:cNvPr>
+          <p:cNvSpPr txBox="1"/>
+          <p:nvPr/>
+        </p:nvSpPr>
+        <p:spPr>
+          <a:xfrm>
+            <a:off x="4302690" y="5009244"/>
+            <a:ext cx="1576072" cy="292388"/>
+          </a:xfrm>
+          <a:prstGeom prst="rect">
+            <a:avLst/>
+          </a:prstGeom>
+          <a:noFill/>
+          <a:ln w="19050">
+            <a:solidFill>
+              <a:schemeClr val="accent1">
+                <a:shade val="50000"/>
+              </a:schemeClr>
+            </a:solidFill>
+          </a:ln>
+        </p:spPr>
+        <p:txBody>
+          <a:bodyPr wrap="none" rtlCol="0">
+            <a:spAutoFit/>
+          </a:bodyPr>
+          <a:lstStyle/>
+          <a:p>
+            <a:r>
+              <a:rPr lang="en-US" sz="1300" dirty="0">
+                <a:latin typeface="Courier New" panose="02070309020205020404" pitchFamily="49" charset="0"/>
+                <a:cs typeface="Courier New" panose="02070309020205020404" pitchFamily="49" charset="0"/>
+              </a:rPr>
+              <a:t>$</a:t>
+            </a:r>
+            <a:r>
+              <a:rPr lang="en-US" sz="1300" dirty="0" err="1">
+                <a:latin typeface="Courier New" panose="02070309020205020404" pitchFamily="49" charset="0"/>
+                <a:cs typeface="Courier New" panose="02070309020205020404" pitchFamily="49" charset="0"/>
+              </a:rPr>
+              <a:t>bf_ineq_table</a:t>
+            </a:r>
+            <a:endParaRPr lang="en-US" sz="1300" dirty="0">
+              <a:latin typeface="Courier New" panose="02070309020205020404" pitchFamily="49" charset="0"/>
+              <a:cs typeface="Courier New" panose="02070309020205020404" pitchFamily="49" charset="0"/>
+            </a:endParaRPr>
+          </a:p>
+        </p:txBody>
+      </p:sp>
+      <p:sp>
+        <p:nvSpPr>
+          <p:cNvPr id="287" name="TextBox 286">
+            <a:extLst>
+              <a:ext uri="{FF2B5EF4-FFF2-40B4-BE49-F238E27FC236}">
+                <a16:creationId xmlns:a16="http://schemas.microsoft.com/office/drawing/2014/main" id="{0B9B1547-D89E-3C4E-AA82-61F21B5F7A7A}"/>
+              </a:ext>
+            </a:extLst>
+          </p:cNvPr>
+          <p:cNvSpPr txBox="1"/>
+          <p:nvPr/>
+        </p:nvSpPr>
+        <p:spPr>
+          <a:xfrm>
+            <a:off x="4312797" y="4647929"/>
+            <a:ext cx="1079142" cy="292388"/>
+          </a:xfrm>
+          <a:prstGeom prst="rect">
+            <a:avLst/>
+          </a:prstGeom>
+          <a:noFill/>
+          <a:ln w="19050">
+            <a:solidFill>
+              <a:schemeClr val="accent1">
+                <a:shade val="50000"/>
+              </a:schemeClr>
+            </a:solidFill>
+          </a:ln>
+        </p:spPr>
+        <p:txBody>
+          <a:bodyPr wrap="none" rtlCol="0">
+            <a:spAutoFit/>
+          </a:bodyPr>
+          <a:lstStyle/>
+          <a:p>
+            <a:r>
+              <a:rPr lang="en-US" sz="1300" dirty="0">
+                <a:latin typeface="Courier New" panose="02070309020205020404" pitchFamily="49" charset="0"/>
+                <a:cs typeface="Courier New" panose="02070309020205020404" pitchFamily="49" charset="0"/>
+              </a:rPr>
+              <a:t>$</a:t>
+            </a:r>
+            <a:r>
+              <a:rPr lang="en-US" sz="1300" dirty="0" err="1">
+                <a:latin typeface="Courier New" panose="02070309020205020404" pitchFamily="49" charset="0"/>
+                <a:cs typeface="Courier New" panose="02070309020205020404" pitchFamily="49" charset="0"/>
+              </a:rPr>
+              <a:t>bf_table</a:t>
+            </a:r>
+            <a:endParaRPr lang="en-US" sz="1300" dirty="0">
+              <a:latin typeface="Courier New" panose="02070309020205020404" pitchFamily="49" charset="0"/>
+              <a:cs typeface="Courier New" panose="02070309020205020404" pitchFamily="49" charset="0"/>
+            </a:endParaRPr>
+          </a:p>
+        </p:txBody>
+      </p:sp>
+      <p:sp>
+        <p:nvSpPr>
+          <p:cNvPr id="289" name="Rounded Rectangle 288">
+            <a:extLst>
+              <a:ext uri="{FF2B5EF4-FFF2-40B4-BE49-F238E27FC236}">
+                <a16:creationId xmlns:a16="http://schemas.microsoft.com/office/drawing/2014/main" id="{225F7C80-BFA2-684D-A758-D53257681F57}"/>
+              </a:ext>
+            </a:extLst>
+          </p:cNvPr>
+          <p:cNvSpPr/>
+          <p:nvPr/>
+        </p:nvSpPr>
+        <p:spPr>
+          <a:xfrm>
+            <a:off x="7175390" y="4518364"/>
+            <a:ext cx="2022163" cy="843905"/>
+          </a:xfrm>
+          <a:prstGeom prst="roundRect">
+            <a:avLst/>
+          </a:prstGeom>
+          <a:noFill/>
+          <a:ln w="38100"/>
+        </p:spPr>
+        <p:style>
+          <a:lnRef idx="2">
+            <a:schemeClr val="accent1">
+              <a:shade val="50000"/>
+            </a:schemeClr>
+          </a:lnRef>
+          <a:fillRef idx="1">
+            <a:schemeClr val="accent1"/>
+          </a:fillRef>
+          <a:effectRef idx="0">
+            <a:schemeClr val="accent1"/>
+          </a:effectRef>
+          <a:fontRef idx="minor">
+            <a:schemeClr val="lt1"/>
+          </a:fontRef>
+        </p:style>
+        <p:txBody>
+          <a:bodyPr rtlCol="0" anchor="ctr"/>
+          <a:lstStyle/>
+          <a:p>
+            <a:pPr algn="ctr"/>
+            <a:endParaRPr lang="en-US" sz="2520" dirty="0"/>
+          </a:p>
+        </p:txBody>
+      </p:sp>
+      <p:sp>
+        <p:nvSpPr>
+          <p:cNvPr id="293" name="TextBox 292">
+            <a:extLst>
+              <a:ext uri="{FF2B5EF4-FFF2-40B4-BE49-F238E27FC236}">
+                <a16:creationId xmlns:a16="http://schemas.microsoft.com/office/drawing/2014/main" id="{7920231F-F203-004C-A606-5D94250796D9}"/>
+              </a:ext>
+            </a:extLst>
+          </p:cNvPr>
+          <p:cNvSpPr txBox="1"/>
+          <p:nvPr/>
+        </p:nvSpPr>
+        <p:spPr>
+          <a:xfrm>
+            <a:off x="7409336" y="4970356"/>
+            <a:ext cx="1576072" cy="292388"/>
+          </a:xfrm>
+          <a:prstGeom prst="rect">
+            <a:avLst/>
+          </a:prstGeom>
+          <a:noFill/>
+          <a:ln w="19050">
+            <a:solidFill>
+              <a:schemeClr val="accent1">
+                <a:shade val="50000"/>
+              </a:schemeClr>
+            </a:solidFill>
+          </a:ln>
+        </p:spPr>
+        <p:txBody>
+          <a:bodyPr wrap="none" rtlCol="0">
+            <a:spAutoFit/>
+          </a:bodyPr>
+          <a:lstStyle/>
+          <a:p>
+            <a:r>
+              <a:rPr lang="en-US" sz="1300" dirty="0">
+                <a:latin typeface="Courier New" panose="02070309020205020404" pitchFamily="49" charset="0"/>
+                <a:cs typeface="Courier New" panose="02070309020205020404" pitchFamily="49" charset="0"/>
+              </a:rPr>
+              <a:t>$</a:t>
+            </a:r>
+            <a:r>
+              <a:rPr lang="en-US" sz="1300" dirty="0" err="1">
+                <a:latin typeface="Courier New" panose="02070309020205020404" pitchFamily="49" charset="0"/>
+                <a:cs typeface="Courier New" panose="02070309020205020404" pitchFamily="49" charset="0"/>
+              </a:rPr>
+              <a:t>post_samples</a:t>
+            </a:r>
+            <a:r>
+              <a:rPr lang="en-US" sz="1300" dirty="0">
+                <a:latin typeface="Courier New" panose="02070309020205020404" pitchFamily="49" charset="0"/>
+                <a:cs typeface="Courier New" panose="02070309020205020404" pitchFamily="49" charset="0"/>
+              </a:rPr>
+              <a:t> </a:t>
+            </a:r>
+          </a:p>
+        </p:txBody>
+      </p:sp>
+      <p:sp>
+        <p:nvSpPr>
+          <p:cNvPr id="294" name="TextBox 293">
+            <a:extLst>
+              <a:ext uri="{FF2B5EF4-FFF2-40B4-BE49-F238E27FC236}">
+                <a16:creationId xmlns:a16="http://schemas.microsoft.com/office/drawing/2014/main" id="{89F61C17-1701-BB4D-BBD5-F97173A399E4}"/>
+              </a:ext>
+            </a:extLst>
+          </p:cNvPr>
+          <p:cNvSpPr txBox="1"/>
+          <p:nvPr/>
+        </p:nvSpPr>
+        <p:spPr>
+          <a:xfrm>
+            <a:off x="7418091" y="4640977"/>
+            <a:ext cx="1576072" cy="292388"/>
+          </a:xfrm>
+          <a:prstGeom prst="rect">
+            <a:avLst/>
+          </a:prstGeom>
+          <a:noFill/>
+          <a:ln w="19050">
+            <a:solidFill>
+              <a:schemeClr val="accent1">
+                <a:shade val="50000"/>
+              </a:schemeClr>
+            </a:solidFill>
+          </a:ln>
+        </p:spPr>
+        <p:txBody>
+          <a:bodyPr wrap="none" rtlCol="0">
+            <a:spAutoFit/>
+          </a:bodyPr>
+          <a:lstStyle/>
+          <a:p>
+            <a:r>
+              <a:rPr lang="en-US" sz="1300" dirty="0">
+                <a:latin typeface="Courier New" panose="02070309020205020404" pitchFamily="49" charset="0"/>
+                <a:cs typeface="Courier New" panose="02070309020205020404" pitchFamily="49" charset="0"/>
+              </a:rPr>
+              <a:t>$</a:t>
+            </a:r>
+            <a:r>
+              <a:rPr lang="en-US" sz="1300" dirty="0" err="1">
+                <a:latin typeface="Courier New" panose="02070309020205020404" pitchFamily="49" charset="0"/>
+                <a:cs typeface="Courier New" panose="02070309020205020404" pitchFamily="49" charset="0"/>
+              </a:rPr>
+              <a:t>prior_samples</a:t>
+            </a:r>
+            <a:endParaRPr lang="en-US" sz="1300" dirty="0">
+              <a:latin typeface="Courier New" panose="02070309020205020404" pitchFamily="49" charset="0"/>
+              <a:cs typeface="Courier New" panose="02070309020205020404" pitchFamily="49" charset="0"/>
+            </a:endParaRPr>
+          </a:p>
+        </p:txBody>
+      </p:sp>
+      <p:cxnSp>
+        <p:nvCxnSpPr>
+          <p:cNvPr id="295" name="Straight Arrow Connector 294">
+            <a:extLst>
+              <a:ext uri="{FF2B5EF4-FFF2-40B4-BE49-F238E27FC236}">
+                <a16:creationId xmlns:a16="http://schemas.microsoft.com/office/drawing/2014/main" id="{826EE440-A387-D14B-B0B7-CBA2C0397A82}"/>
+              </a:ext>
+            </a:extLst>
+          </p:cNvPr>
+          <p:cNvCxnSpPr>
+            <a:cxnSpLocks/>
+            <a:stCxn id="228" idx="2"/>
+            <a:endCxn id="283" idx="0"/>
+          </p:cNvCxnSpPr>
+          <p:nvPr/>
+        </p:nvCxnSpPr>
+        <p:spPr>
+          <a:xfrm>
+            <a:off x="5037506" y="4312913"/>
+            <a:ext cx="887" cy="232779"/>
+          </a:xfrm>
+          <a:prstGeom prst="straightConnector1">
+            <a:avLst/>
+          </a:prstGeom>
+          <a:ln w="38100">
+            <a:tailEnd type="triangle"/>
+          </a:ln>
+        </p:spPr>
+        <p:style>
+          <a:lnRef idx="1">
+            <a:schemeClr val="accent1"/>
+          </a:lnRef>
+          <a:fillRef idx="0">
+            <a:schemeClr val="accent1"/>
+          </a:fillRef>
+          <a:effectRef idx="0">
+            <a:schemeClr val="accent1"/>
+          </a:effectRef>
+          <a:fontRef idx="minor">
+            <a:schemeClr val="tx1"/>
+          </a:fontRef>
+        </p:style>
+      </p:cxnSp>
+      <p:cxnSp>
+        <p:nvCxnSpPr>
+          <p:cNvPr id="298" name="Straight Arrow Connector 297">
+            <a:extLst>
+              <a:ext uri="{FF2B5EF4-FFF2-40B4-BE49-F238E27FC236}">
+                <a16:creationId xmlns:a16="http://schemas.microsoft.com/office/drawing/2014/main" id="{769E612E-4C1B-DA45-8A60-1CE57624F37E}"/>
+              </a:ext>
+            </a:extLst>
+          </p:cNvPr>
+          <p:cNvCxnSpPr>
+            <a:cxnSpLocks/>
+            <a:stCxn id="229" idx="2"/>
+            <a:endCxn id="289" idx="0"/>
+          </p:cNvCxnSpPr>
+          <p:nvPr/>
+        </p:nvCxnSpPr>
+        <p:spPr>
+          <a:xfrm>
+            <a:off x="8176401" y="4312913"/>
+            <a:ext cx="10071" cy="205451"/>
+          </a:xfrm>
+          <a:prstGeom prst="straightConnector1">
+            <a:avLst/>
+          </a:prstGeom>
+          <a:ln w="38100">
+            <a:tailEnd type="triangle"/>
+          </a:ln>
+        </p:spPr>
+        <p:style>
+          <a:lnRef idx="1">
+            <a:schemeClr val="accent1"/>
+          </a:lnRef>
+          <a:fillRef idx="0">
+            <a:schemeClr val="accent1"/>
+          </a:fillRef>
+          <a:effectRef idx="0">
+            <a:schemeClr val="accent1"/>
+          </a:effectRef>
+          <a:fontRef idx="minor">
+            <a:schemeClr val="tx1"/>
+          </a:fontRef>
+        </p:style>
+      </p:cxnSp>
     </p:spTree>
     <p:extLst>
       <p:ext uri="{BB962C8B-B14F-4D97-AF65-F5344CB8AC3E}">

</xml_diff>

<commit_message>
knitted current version of manuscript and updated figure
</commit_message>
<xml_diff>
--- a/manuscript/scheme_multibridge.pptx
+++ b/manuscript/scheme_multibridge.pptx
@@ -243,7 +243,7 @@
           <a:p>
             <a:fld id="{B3A21784-E1B4-8C4A-A52C-8A1F4FEBB89F}" type="datetimeFigureOut">
               <a:rPr lang="en-US" smtClean="0"/>
-              <a:t>11/20/20</a:t>
+              <a:t>11/25/20</a:t>
             </a:fld>
             <a:endParaRPr lang="en-US"/>
           </a:p>
@@ -413,7 +413,7 @@
           <a:p>
             <a:fld id="{B3A21784-E1B4-8C4A-A52C-8A1F4FEBB89F}" type="datetimeFigureOut">
               <a:rPr lang="en-US" smtClean="0"/>
-              <a:t>11/20/20</a:t>
+              <a:t>11/25/20</a:t>
             </a:fld>
             <a:endParaRPr lang="en-US"/>
           </a:p>
@@ -593,7 +593,7 @@
           <a:p>
             <a:fld id="{B3A21784-E1B4-8C4A-A52C-8A1F4FEBB89F}" type="datetimeFigureOut">
               <a:rPr lang="en-US" smtClean="0"/>
-              <a:t>11/20/20</a:t>
+              <a:t>11/25/20</a:t>
             </a:fld>
             <a:endParaRPr lang="en-US"/>
           </a:p>
@@ -763,7 +763,7 @@
           <a:p>
             <a:fld id="{B3A21784-E1B4-8C4A-A52C-8A1F4FEBB89F}" type="datetimeFigureOut">
               <a:rPr lang="en-US" smtClean="0"/>
-              <a:t>11/20/20</a:t>
+              <a:t>11/25/20</a:t>
             </a:fld>
             <a:endParaRPr lang="en-US"/>
           </a:p>
@@ -1009,7 +1009,7 @@
           <a:p>
             <a:fld id="{B3A21784-E1B4-8C4A-A52C-8A1F4FEBB89F}" type="datetimeFigureOut">
               <a:rPr lang="en-US" smtClean="0"/>
-              <a:t>11/20/20</a:t>
+              <a:t>11/25/20</a:t>
             </a:fld>
             <a:endParaRPr lang="en-US"/>
           </a:p>
@@ -1241,7 +1241,7 @@
           <a:p>
             <a:fld id="{B3A21784-E1B4-8C4A-A52C-8A1F4FEBB89F}" type="datetimeFigureOut">
               <a:rPr lang="en-US" smtClean="0"/>
-              <a:t>11/20/20</a:t>
+              <a:t>11/25/20</a:t>
             </a:fld>
             <a:endParaRPr lang="en-US"/>
           </a:p>
@@ -1608,7 +1608,7 @@
           <a:p>
             <a:fld id="{B3A21784-E1B4-8C4A-A52C-8A1F4FEBB89F}" type="datetimeFigureOut">
               <a:rPr lang="en-US" smtClean="0"/>
-              <a:t>11/20/20</a:t>
+              <a:t>11/25/20</a:t>
             </a:fld>
             <a:endParaRPr lang="en-US"/>
           </a:p>
@@ -1726,7 +1726,7 @@
           <a:p>
             <a:fld id="{B3A21784-E1B4-8C4A-A52C-8A1F4FEBB89F}" type="datetimeFigureOut">
               <a:rPr lang="en-US" smtClean="0"/>
-              <a:t>11/20/20</a:t>
+              <a:t>11/25/20</a:t>
             </a:fld>
             <a:endParaRPr lang="en-US"/>
           </a:p>
@@ -1821,7 +1821,7 @@
           <a:p>
             <a:fld id="{B3A21784-E1B4-8C4A-A52C-8A1F4FEBB89F}" type="datetimeFigureOut">
               <a:rPr lang="en-US" smtClean="0"/>
-              <a:t>11/20/20</a:t>
+              <a:t>11/25/20</a:t>
             </a:fld>
             <a:endParaRPr lang="en-US"/>
           </a:p>
@@ -2098,7 +2098,7 @@
           <a:p>
             <a:fld id="{B3A21784-E1B4-8C4A-A52C-8A1F4FEBB89F}" type="datetimeFigureOut">
               <a:rPr lang="en-US" smtClean="0"/>
-              <a:t>11/20/20</a:t>
+              <a:t>11/25/20</a:t>
             </a:fld>
             <a:endParaRPr lang="en-US"/>
           </a:p>
@@ -2355,7 +2355,7 @@
           <a:p>
             <a:fld id="{B3A21784-E1B4-8C4A-A52C-8A1F4FEBB89F}" type="datetimeFigureOut">
               <a:rPr lang="en-US" smtClean="0"/>
-              <a:t>11/20/20</a:t>
+              <a:t>11/25/20</a:t>
             </a:fld>
             <a:endParaRPr lang="en-US"/>
           </a:p>
@@ -2568,7 +2568,7 @@
           <a:p>
             <a:fld id="{B3A21784-E1B4-8C4A-A52C-8A1F4FEBB89F}" type="datetimeFigureOut">
               <a:rPr lang="en-US" smtClean="0"/>
-              <a:t>11/20/20</a:t>
+              <a:t>11/25/20</a:t>
             </a:fld>
             <a:endParaRPr lang="en-US"/>
           </a:p>
@@ -3051,7 +3051,7 @@
         </p:nvSpPr>
         <p:spPr>
           <a:xfrm>
-            <a:off x="4624046" y="1111303"/>
+            <a:off x="4756250" y="1111303"/>
             <a:ext cx="4589153" cy="986949"/>
           </a:xfrm>
           <a:prstGeom prst="roundRect">
@@ -3139,7 +3139,7 @@
         <p:spPr>
           <a:xfrm flipH="1">
             <a:off x="1926249" y="2098252"/>
-            <a:ext cx="4992374" cy="397619"/>
+            <a:ext cx="5124578" cy="397619"/>
           </a:xfrm>
           <a:prstGeom prst="straightConnector1">
             <a:avLst/>
@@ -3178,7 +3178,7 @@
         <p:spPr>
           <a:xfrm>
             <a:off x="6021326" y="228028"/>
-            <a:ext cx="2010487" cy="707886"/>
+            <a:ext cx="2115610" cy="707886"/>
           </a:xfrm>
           <a:prstGeom prst="rect">
             <a:avLst/>
@@ -3196,7 +3196,7 @@
                 <a:latin typeface="Courier New" panose="02070309020205020404" pitchFamily="49" charset="0"/>
                 <a:cs typeface="Courier New" panose="02070309020205020404" pitchFamily="49" charset="0"/>
               </a:rPr>
-              <a:t>multBfInformed</a:t>
+              <a:t>mult_bf_informed</a:t>
             </a:r>
             <a:r>
               <a:rPr lang="en-US" sz="1300" dirty="0">
@@ -3212,7 +3212,7 @@
                 <a:latin typeface="Courier New" panose="02070309020205020404" pitchFamily="49" charset="0"/>
                 <a:cs typeface="Courier New" panose="02070309020205020404" pitchFamily="49" charset="0"/>
               </a:rPr>
-              <a:t>binomBfInformed</a:t>
+              <a:t>binom_bf_informed</a:t>
             </a:r>
             <a:r>
               <a:rPr lang="en-US" sz="1300" dirty="0">
@@ -3423,8 +3423,8 @@
         </p:nvCxnSpPr>
         <p:spPr>
           <a:xfrm>
-            <a:off x="6916249" y="937751"/>
-            <a:ext cx="2374" cy="173552"/>
+            <a:off x="7049199" y="937751"/>
+            <a:ext cx="1628" cy="173552"/>
           </a:xfrm>
           <a:prstGeom prst="straightConnector1">
             <a:avLst/>
@@ -3549,8 +3549,8 @@
         </p:nvCxnSpPr>
         <p:spPr>
           <a:xfrm>
-            <a:off x="6918623" y="2098252"/>
-            <a:ext cx="1254690" cy="397619"/>
+            <a:off x="7050827" y="2098252"/>
+            <a:ext cx="1122486" cy="397619"/>
           </a:xfrm>
           <a:prstGeom prst="straightConnector1">
             <a:avLst/>
@@ -3593,7 +3593,7 @@
         <p:spPr>
           <a:xfrm flipH="1">
             <a:off x="5034418" y="2098252"/>
-            <a:ext cx="1884205" cy="397619"/>
+            <a:ext cx="2016409" cy="397619"/>
           </a:xfrm>
           <a:prstGeom prst="straightConnector1">
             <a:avLst/>
@@ -4000,8 +4000,8 @@
         </p:nvCxnSpPr>
         <p:spPr>
           <a:xfrm>
-            <a:off x="6918623" y="2098252"/>
-            <a:ext cx="4361499" cy="395818"/>
+            <a:off x="7050827" y="2098252"/>
+            <a:ext cx="4229295" cy="395818"/>
           </a:xfrm>
           <a:prstGeom prst="straightConnector1">
             <a:avLst/>
@@ -4351,7 +4351,7 @@
         <p:spPr>
           <a:xfrm>
             <a:off x="5439139" y="29026"/>
-            <a:ext cx="2954219" cy="908725"/>
+            <a:ext cx="3220119" cy="908725"/>
           </a:xfrm>
           <a:prstGeom prst="diamond">
             <a:avLst/>

</xml_diff>

<commit_message>
rewrote introduction and updated multibridge scheme
</commit_message>
<xml_diff>
--- a/manuscript/scheme_multibridge.pptx
+++ b/manuscript/scheme_multibridge.pptx
@@ -243,7 +243,7 @@
           <a:p>
             <a:fld id="{B3A21784-E1B4-8C4A-A52C-8A1F4FEBB89F}" type="datetimeFigureOut">
               <a:rPr lang="en-US" smtClean="0"/>
-              <a:t>11/25/20</a:t>
+              <a:t>11/30/20</a:t>
             </a:fld>
             <a:endParaRPr lang="en-US"/>
           </a:p>
@@ -413,7 +413,7 @@
           <a:p>
             <a:fld id="{B3A21784-E1B4-8C4A-A52C-8A1F4FEBB89F}" type="datetimeFigureOut">
               <a:rPr lang="en-US" smtClean="0"/>
-              <a:t>11/25/20</a:t>
+              <a:t>11/30/20</a:t>
             </a:fld>
             <a:endParaRPr lang="en-US"/>
           </a:p>
@@ -593,7 +593,7 @@
           <a:p>
             <a:fld id="{B3A21784-E1B4-8C4A-A52C-8A1F4FEBB89F}" type="datetimeFigureOut">
               <a:rPr lang="en-US" smtClean="0"/>
-              <a:t>11/25/20</a:t>
+              <a:t>11/30/20</a:t>
             </a:fld>
             <a:endParaRPr lang="en-US"/>
           </a:p>
@@ -763,7 +763,7 @@
           <a:p>
             <a:fld id="{B3A21784-E1B4-8C4A-A52C-8A1F4FEBB89F}" type="datetimeFigureOut">
               <a:rPr lang="en-US" smtClean="0"/>
-              <a:t>11/25/20</a:t>
+              <a:t>11/30/20</a:t>
             </a:fld>
             <a:endParaRPr lang="en-US"/>
           </a:p>
@@ -1009,7 +1009,7 @@
           <a:p>
             <a:fld id="{B3A21784-E1B4-8C4A-A52C-8A1F4FEBB89F}" type="datetimeFigureOut">
               <a:rPr lang="en-US" smtClean="0"/>
-              <a:t>11/25/20</a:t>
+              <a:t>11/30/20</a:t>
             </a:fld>
             <a:endParaRPr lang="en-US"/>
           </a:p>
@@ -1241,7 +1241,7 @@
           <a:p>
             <a:fld id="{B3A21784-E1B4-8C4A-A52C-8A1F4FEBB89F}" type="datetimeFigureOut">
               <a:rPr lang="en-US" smtClean="0"/>
-              <a:t>11/25/20</a:t>
+              <a:t>11/30/20</a:t>
             </a:fld>
             <a:endParaRPr lang="en-US"/>
           </a:p>
@@ -1608,7 +1608,7 @@
           <a:p>
             <a:fld id="{B3A21784-E1B4-8C4A-A52C-8A1F4FEBB89F}" type="datetimeFigureOut">
               <a:rPr lang="en-US" smtClean="0"/>
-              <a:t>11/25/20</a:t>
+              <a:t>11/30/20</a:t>
             </a:fld>
             <a:endParaRPr lang="en-US"/>
           </a:p>
@@ -1726,7 +1726,7 @@
           <a:p>
             <a:fld id="{B3A21784-E1B4-8C4A-A52C-8A1F4FEBB89F}" type="datetimeFigureOut">
               <a:rPr lang="en-US" smtClean="0"/>
-              <a:t>11/25/20</a:t>
+              <a:t>11/30/20</a:t>
             </a:fld>
             <a:endParaRPr lang="en-US"/>
           </a:p>
@@ -1821,7 +1821,7 @@
           <a:p>
             <a:fld id="{B3A21784-E1B4-8C4A-A52C-8A1F4FEBB89F}" type="datetimeFigureOut">
               <a:rPr lang="en-US" smtClean="0"/>
-              <a:t>11/25/20</a:t>
+              <a:t>11/30/20</a:t>
             </a:fld>
             <a:endParaRPr lang="en-US"/>
           </a:p>
@@ -2098,7 +2098,7 @@
           <a:p>
             <a:fld id="{B3A21784-E1B4-8C4A-A52C-8A1F4FEBB89F}" type="datetimeFigureOut">
               <a:rPr lang="en-US" smtClean="0"/>
-              <a:t>11/25/20</a:t>
+              <a:t>11/30/20</a:t>
             </a:fld>
             <a:endParaRPr lang="en-US"/>
           </a:p>
@@ -2355,7 +2355,7 @@
           <a:p>
             <a:fld id="{B3A21784-E1B4-8C4A-A52C-8A1F4FEBB89F}" type="datetimeFigureOut">
               <a:rPr lang="en-US" smtClean="0"/>
-              <a:t>11/25/20</a:t>
+              <a:t>11/30/20</a:t>
             </a:fld>
             <a:endParaRPr lang="en-US"/>
           </a:p>
@@ -2568,7 +2568,7 @@
           <a:p>
             <a:fld id="{B3A21784-E1B4-8C4A-A52C-8A1F4FEBB89F}" type="datetimeFigureOut">
               <a:rPr lang="en-US" smtClean="0"/>
-              <a:t>11/25/20</a:t>
+              <a:t>11/30/20</a:t>
             </a:fld>
             <a:endParaRPr lang="en-US"/>
           </a:p>
@@ -2987,8 +2987,8 @@
         </p:nvSpPr>
         <p:spPr>
           <a:xfrm>
-            <a:off x="4081075" y="5350974"/>
-            <a:ext cx="1194005" cy="1892826"/>
+            <a:off x="4056173" y="5444891"/>
+            <a:ext cx="1243629" cy="1692771"/>
           </a:xfrm>
           <a:prstGeom prst="rect">
             <a:avLst/>
@@ -3029,7 +3029,7 @@
         </p:blipFill>
         <p:spPr>
           <a:xfrm>
-            <a:off x="5243873" y="5433060"/>
+            <a:off x="5354043" y="5433060"/>
             <a:ext cx="1793526" cy="1741727"/>
           </a:xfrm>
           <a:prstGeom prst="rect">
@@ -3138,8 +3138,8 @@
         </p:nvCxnSpPr>
         <p:spPr>
           <a:xfrm flipH="1">
-            <a:off x="1926249" y="2098252"/>
-            <a:ext cx="5124578" cy="397619"/>
+            <a:off x="1970317" y="2098252"/>
+            <a:ext cx="5080510" cy="397619"/>
           </a:xfrm>
           <a:prstGeom prst="straightConnector1">
             <a:avLst/>
@@ -3244,7 +3244,7 @@
         </p:nvSpPr>
         <p:spPr>
           <a:xfrm>
-            <a:off x="1482187" y="6131277"/>
+            <a:off x="1559306" y="6109243"/>
             <a:ext cx="829073" cy="307777"/>
           </a:xfrm>
           <a:prstGeom prst="rect">
@@ -3384,8 +3384,8 @@
         </p:nvSpPr>
         <p:spPr>
           <a:xfrm>
-            <a:off x="607405" y="3802070"/>
-            <a:ext cx="2578638" cy="492443"/>
+            <a:off x="465558" y="3811688"/>
+            <a:ext cx="3114541" cy="292388"/>
           </a:xfrm>
           <a:prstGeom prst="rect">
             <a:avLst/>
@@ -3462,7 +3462,7 @@
         </p:nvSpPr>
         <p:spPr>
           <a:xfrm>
-            <a:off x="4215589" y="2797953"/>
+            <a:off x="4579143" y="2797953"/>
             <a:ext cx="1688283" cy="307777"/>
           </a:xfrm>
           <a:prstGeom prst="rect">
@@ -3592,8 +3592,8 @@
         </p:nvCxnSpPr>
         <p:spPr>
           <a:xfrm flipH="1">
-            <a:off x="5034418" y="2098252"/>
-            <a:ext cx="2016409" cy="397619"/>
+            <a:off x="5408992" y="2098252"/>
+            <a:ext cx="1641835" cy="397619"/>
           </a:xfrm>
           <a:prstGeom prst="straightConnector1">
             <a:avLst/>
@@ -3631,7 +3631,7 @@
         </p:nvSpPr>
         <p:spPr>
           <a:xfrm>
-            <a:off x="4131185" y="3800660"/>
+            <a:off x="4494739" y="3800660"/>
             <a:ext cx="1860522" cy="492443"/>
           </a:xfrm>
           <a:prstGeom prst="rect">
@@ -3757,7 +3757,7 @@
         </p:nvSpPr>
         <p:spPr>
           <a:xfrm>
-            <a:off x="1633148" y="4389137"/>
+            <a:off x="1085075" y="4147270"/>
             <a:ext cx="482824" cy="292388"/>
           </a:xfrm>
           <a:prstGeom prst="rect">
@@ -3802,7 +3802,7 @@
         </p:nvSpPr>
         <p:spPr>
           <a:xfrm>
-            <a:off x="5046412" y="1708403"/>
+            <a:off x="5299802" y="1708403"/>
             <a:ext cx="1688283" cy="307777"/>
           </a:xfrm>
           <a:prstGeom prst="rect">
@@ -3856,7 +3856,7 @@
         </p:nvSpPr>
         <p:spPr>
           <a:xfrm>
-            <a:off x="4755955" y="1295067"/>
+            <a:off x="4855108" y="1295067"/>
             <a:ext cx="1043876" cy="307777"/>
           </a:xfrm>
           <a:prstGeom prst="rect">
@@ -3910,7 +3910,7 @@
         </p:nvSpPr>
         <p:spPr>
           <a:xfrm>
-            <a:off x="7540469" y="1293291"/>
+            <a:off x="7639622" y="1293291"/>
             <a:ext cx="1580882" cy="307777"/>
           </a:xfrm>
           <a:prstGeom prst="rect">
@@ -3953,7 +3953,7 @@
         </p:nvSpPr>
         <p:spPr>
           <a:xfrm>
-            <a:off x="6917436" y="1695771"/>
+            <a:off x="7175390" y="1686350"/>
             <a:ext cx="1043876" cy="307777"/>
           </a:xfrm>
           <a:prstGeom prst="rect">
@@ -4119,7 +4119,7 @@
         </p:nvSpPr>
         <p:spPr>
           <a:xfrm>
-            <a:off x="5987110" y="1293291"/>
+            <a:off x="6086263" y="1293291"/>
             <a:ext cx="1366080" cy="307777"/>
           </a:xfrm>
           <a:prstGeom prst="rect">
@@ -4173,8 +4173,8 @@
         </p:nvSpPr>
         <p:spPr>
           <a:xfrm>
-            <a:off x="461423" y="3729804"/>
-            <a:ext cx="2927558" cy="1408614"/>
+            <a:off x="300142" y="3729804"/>
+            <a:ext cx="3354479" cy="1578018"/>
           </a:xfrm>
           <a:prstGeom prst="roundRect">
             <a:avLst/>
@@ -4224,9 +4224,9 @@
           <p:nvPr/>
         </p:nvCxnSpPr>
         <p:spPr>
-          <a:xfrm flipH="1">
-            <a:off x="1925202" y="3401696"/>
-            <a:ext cx="1047" cy="328108"/>
+          <a:xfrm>
+            <a:off x="1970317" y="3401696"/>
+            <a:ext cx="7065" cy="328108"/>
           </a:xfrm>
           <a:prstGeom prst="straightConnector1">
             <a:avLst/>
@@ -4267,9 +4267,9 @@
           <p:nvPr/>
         </p:nvCxnSpPr>
         <p:spPr>
-          <a:xfrm>
-            <a:off x="1925202" y="5138418"/>
-            <a:ext cx="1046" cy="691671"/>
+          <a:xfrm flipH="1">
+            <a:off x="1970316" y="5307822"/>
+            <a:ext cx="7066" cy="500233"/>
           </a:xfrm>
           <a:prstGeom prst="straightConnector1">
             <a:avLst/>
@@ -4398,7 +4398,7 @@
         </p:nvSpPr>
         <p:spPr>
           <a:xfrm>
-            <a:off x="826266" y="2495871"/>
+            <a:off x="870334" y="2495871"/>
             <a:ext cx="2199966" cy="905825"/>
           </a:xfrm>
           <a:prstGeom prst="diamond">
@@ -4446,7 +4446,7 @@
         </p:nvSpPr>
         <p:spPr>
           <a:xfrm>
-            <a:off x="3934435" y="2495871"/>
+            <a:off x="4309009" y="2495871"/>
             <a:ext cx="2199966" cy="905825"/>
           </a:xfrm>
           <a:prstGeom prst="diamond">
@@ -4590,7 +4590,7 @@
         </p:nvSpPr>
         <p:spPr>
           <a:xfrm>
-            <a:off x="933214" y="4380800"/>
+            <a:off x="418052" y="4149444"/>
             <a:ext cx="582211" cy="292388"/>
           </a:xfrm>
           <a:prstGeom prst="rect">
@@ -4646,7 +4646,7 @@
         </p:nvSpPr>
         <p:spPr>
           <a:xfrm>
-            <a:off x="621448" y="4759475"/>
+            <a:off x="618809" y="4907100"/>
             <a:ext cx="1277914" cy="292388"/>
           </a:xfrm>
           <a:prstGeom prst="rect">
@@ -4702,7 +4702,7 @@
         </p:nvSpPr>
         <p:spPr>
           <a:xfrm>
-            <a:off x="2206288" y="4394539"/>
+            <a:off x="1630678" y="4143869"/>
             <a:ext cx="979755" cy="292388"/>
           </a:xfrm>
           <a:prstGeom prst="rect">
@@ -4758,7 +4758,7 @@
         </p:nvSpPr>
         <p:spPr>
           <a:xfrm>
-            <a:off x="1987160" y="4765842"/>
+            <a:off x="1992295" y="4916665"/>
             <a:ext cx="1178528" cy="292388"/>
           </a:xfrm>
           <a:prstGeom prst="rect">
@@ -5109,7 +5109,7 @@
         </p:nvSpPr>
         <p:spPr>
           <a:xfrm>
-            <a:off x="4081075" y="3727594"/>
+            <a:off x="4444629" y="3727594"/>
             <a:ext cx="1914636" cy="1408614"/>
           </a:xfrm>
           <a:prstGeom prst="roundRect">
@@ -5157,7 +5157,7 @@
         </p:nvSpPr>
         <p:spPr>
           <a:xfrm>
-            <a:off x="4302690" y="4755854"/>
+            <a:off x="4666244" y="4755854"/>
             <a:ext cx="1576072" cy="292388"/>
           </a:xfrm>
           <a:prstGeom prst="rect">
@@ -5213,7 +5213,7 @@
         </p:nvSpPr>
         <p:spPr>
           <a:xfrm>
-            <a:off x="4312797" y="4394539"/>
+            <a:off x="4676351" y="4394539"/>
             <a:ext cx="1079142" cy="292388"/>
           </a:xfrm>
           <a:prstGeom prst="rect">
@@ -5435,9 +5435,9 @@
           <p:nvPr/>
         </p:nvCxnSpPr>
         <p:spPr>
-          <a:xfrm>
-            <a:off x="5034418" y="3401696"/>
-            <a:ext cx="3975" cy="325898"/>
+          <a:xfrm flipH="1">
+            <a:off x="5401947" y="3401696"/>
+            <a:ext cx="7045" cy="325898"/>
           </a:xfrm>
           <a:prstGeom prst="straightConnector1">
             <a:avLst/>
@@ -5522,8 +5522,8 @@
         </p:nvCxnSpPr>
         <p:spPr>
           <a:xfrm>
-            <a:off x="3026231" y="6283002"/>
-            <a:ext cx="959272" cy="14385"/>
+            <a:off x="3070299" y="6260968"/>
+            <a:ext cx="915204" cy="3368"/>
           </a:xfrm>
           <a:prstGeom prst="straightConnector1">
             <a:avLst/>
@@ -5561,8 +5561,8 @@
         </p:nvSpPr>
         <p:spPr>
           <a:xfrm>
-            <a:off x="3985503" y="5308600"/>
-            <a:ext cx="3083643" cy="1977574"/>
+            <a:off x="3985503" y="5275549"/>
+            <a:ext cx="3280859" cy="1977574"/>
           </a:xfrm>
           <a:prstGeom prst="roundRect">
             <a:avLst/>
@@ -5609,7 +5609,7 @@
         </p:nvSpPr>
         <p:spPr>
           <a:xfrm>
-            <a:off x="826265" y="5830089"/>
+            <a:off x="870333" y="5808055"/>
             <a:ext cx="2199966" cy="905825"/>
           </a:xfrm>
           <a:prstGeom prst="diamond">
@@ -5675,6 +5675,208 @@
               <a:rPr lang="en-US" sz="1300" b="1" dirty="0"/>
               <a:t>Basic Arguments</a:t>
             </a:r>
+          </a:p>
+        </p:txBody>
+      </p:sp>
+      <p:sp>
+        <p:nvSpPr>
+          <p:cNvPr id="60" name="TextBox 59">
+            <a:extLst>
+              <a:ext uri="{FF2B5EF4-FFF2-40B4-BE49-F238E27FC236}">
+                <a16:creationId xmlns:a16="http://schemas.microsoft.com/office/drawing/2014/main" id="{31F728D7-121B-2C4A-AF5E-552905A49DF0}"/>
+              </a:ext>
+            </a:extLst>
+          </p:cNvPr>
+          <p:cNvSpPr txBox="1"/>
+          <p:nvPr/>
+        </p:nvSpPr>
+        <p:spPr>
+          <a:xfrm>
+            <a:off x="385401" y="4538647"/>
+            <a:ext cx="681597" cy="292388"/>
+          </a:xfrm>
+          <a:prstGeom prst="rect">
+            <a:avLst/>
+          </a:prstGeom>
+          <a:noFill/>
+          <a:ln w="19050">
+            <a:solidFill>
+              <a:schemeClr val="accent1">
+                <a:shade val="50000"/>
+              </a:schemeClr>
+            </a:solidFill>
+          </a:ln>
+        </p:spPr>
+        <p:txBody>
+          <a:bodyPr wrap="none" rtlCol="0">
+            <a:spAutoFit/>
+          </a:bodyPr>
+          <a:lstStyle/>
+          <a:p>
+            <a:r>
+              <a:rPr lang="en-US" sz="1300" dirty="0">
+                <a:latin typeface="Courier New" panose="02070309020205020404" pitchFamily="49" charset="0"/>
+                <a:cs typeface="Courier New" panose="02070309020205020404" pitchFamily="49" charset="0"/>
+              </a:rPr>
+              <a:t>$data</a:t>
+            </a:r>
+          </a:p>
+        </p:txBody>
+      </p:sp>
+      <p:sp>
+        <p:nvSpPr>
+          <p:cNvPr id="64" name="TextBox 63">
+            <a:extLst>
+              <a:ext uri="{FF2B5EF4-FFF2-40B4-BE49-F238E27FC236}">
+                <a16:creationId xmlns:a16="http://schemas.microsoft.com/office/drawing/2014/main" id="{EDCF925A-283E-164C-A6A5-62F7A4DE47B2}"/>
+              </a:ext>
+            </a:extLst>
+          </p:cNvPr>
+          <p:cNvSpPr txBox="1"/>
+          <p:nvPr/>
+        </p:nvSpPr>
+        <p:spPr>
+          <a:xfrm>
+            <a:off x="2691453" y="4143907"/>
+            <a:ext cx="780983" cy="292388"/>
+          </a:xfrm>
+          <a:prstGeom prst="rect">
+            <a:avLst/>
+          </a:prstGeom>
+          <a:noFill/>
+          <a:ln w="19050">
+            <a:solidFill>
+              <a:schemeClr val="accent1">
+                <a:shade val="50000"/>
+              </a:schemeClr>
+            </a:solidFill>
+          </a:ln>
+        </p:spPr>
+        <p:txBody>
+          <a:bodyPr wrap="none" rtlCol="0">
+            <a:spAutoFit/>
+          </a:bodyPr>
+          <a:lstStyle/>
+          <a:p>
+            <a:r>
+              <a:rPr lang="en-US" sz="1300" dirty="0">
+                <a:latin typeface="Courier New" panose="02070309020205020404" pitchFamily="49" charset="0"/>
+                <a:cs typeface="Courier New" panose="02070309020205020404" pitchFamily="49" charset="0"/>
+              </a:rPr>
+              <a:t>$prior</a:t>
+            </a:r>
+          </a:p>
+        </p:txBody>
+      </p:sp>
+      <p:sp>
+        <p:nvSpPr>
+          <p:cNvPr id="65" name="TextBox 64">
+            <a:extLst>
+              <a:ext uri="{FF2B5EF4-FFF2-40B4-BE49-F238E27FC236}">
+                <a16:creationId xmlns:a16="http://schemas.microsoft.com/office/drawing/2014/main" id="{FD1C41C1-30DE-4648-9596-9A66FFEF687E}"/>
+              </a:ext>
+            </a:extLst>
+          </p:cNvPr>
+          <p:cNvSpPr txBox="1"/>
+          <p:nvPr/>
+        </p:nvSpPr>
+        <p:spPr>
+          <a:xfrm>
+            <a:off x="2309252" y="4538647"/>
+            <a:ext cx="1277914" cy="292388"/>
+          </a:xfrm>
+          <a:prstGeom prst="rect">
+            <a:avLst/>
+          </a:prstGeom>
+          <a:noFill/>
+          <a:ln w="19050">
+            <a:solidFill>
+              <a:schemeClr val="accent1">
+                <a:shade val="50000"/>
+              </a:schemeClr>
+            </a:solidFill>
+          </a:ln>
+        </p:spPr>
+        <p:txBody>
+          <a:bodyPr wrap="none" rtlCol="0">
+            <a:spAutoFit/>
+          </a:bodyPr>
+          <a:lstStyle/>
+          <a:p>
+            <a:r>
+              <a:rPr lang="en-US" sz="1300" dirty="0">
+                <a:latin typeface="Courier New" panose="02070309020205020404" pitchFamily="49" charset="0"/>
+                <a:cs typeface="Courier New" panose="02070309020205020404" pitchFamily="49" charset="0"/>
+              </a:rPr>
+              <a:t>$</a:t>
+            </a:r>
+            <a:r>
+              <a:rPr lang="en-US" sz="1300" dirty="0" err="1">
+                <a:latin typeface="Courier New" panose="02070309020205020404" pitchFamily="49" charset="0"/>
+                <a:cs typeface="Courier New" panose="02070309020205020404" pitchFamily="49" charset="0"/>
+              </a:rPr>
+              <a:t>nr_inequal</a:t>
+            </a:r>
+            <a:endParaRPr lang="en-US" sz="1300" dirty="0">
+              <a:latin typeface="Courier New" panose="02070309020205020404" pitchFamily="49" charset="0"/>
+              <a:cs typeface="Courier New" panose="02070309020205020404" pitchFamily="49" charset="0"/>
+            </a:endParaRPr>
+          </a:p>
+        </p:txBody>
+      </p:sp>
+      <p:sp>
+        <p:nvSpPr>
+          <p:cNvPr id="66" name="TextBox 65">
+            <a:extLst>
+              <a:ext uri="{FF2B5EF4-FFF2-40B4-BE49-F238E27FC236}">
+                <a16:creationId xmlns:a16="http://schemas.microsoft.com/office/drawing/2014/main" id="{B32E5CA1-CF25-0943-B1A0-473C999D3B84}"/>
+              </a:ext>
+            </a:extLst>
+          </p:cNvPr>
+          <p:cNvSpPr txBox="1"/>
+          <p:nvPr/>
+        </p:nvSpPr>
+        <p:spPr>
+          <a:xfrm>
+            <a:off x="1144790" y="4538647"/>
+            <a:ext cx="1079142" cy="292388"/>
+          </a:xfrm>
+          <a:prstGeom prst="rect">
+            <a:avLst/>
+          </a:prstGeom>
+          <a:noFill/>
+          <a:ln w="19050">
+            <a:solidFill>
+              <a:schemeClr val="accent1">
+                <a:shade val="50000"/>
+              </a:schemeClr>
+            </a:solidFill>
+          </a:ln>
+        </p:spPr>
+        <p:txBody>
+          <a:bodyPr wrap="none" rtlCol="0">
+            <a:spAutoFit/>
+          </a:bodyPr>
+          <a:lstStyle/>
+          <a:p>
+            <a:r>
+              <a:rPr lang="en-US" sz="1300" dirty="0">
+                <a:latin typeface="Courier New" panose="02070309020205020404" pitchFamily="49" charset="0"/>
+                <a:cs typeface="Courier New" panose="02070309020205020404" pitchFamily="49" charset="0"/>
+              </a:rPr>
+              <a:t>$</a:t>
+            </a:r>
+            <a:r>
+              <a:rPr lang="en-US" sz="1300" dirty="0" err="1">
+                <a:latin typeface="Courier New" panose="02070309020205020404" pitchFamily="49" charset="0"/>
+                <a:cs typeface="Courier New" panose="02070309020205020404" pitchFamily="49" charset="0"/>
+              </a:rPr>
+              <a:t>nr_equal</a:t>
+            </a:r>
+            <a:endParaRPr lang="en-US" sz="1300" dirty="0">
+              <a:latin typeface="Courier New" panose="02070309020205020404" pitchFamily="49" charset="0"/>
+              <a:cs typeface="Courier New" panose="02070309020205020404" pitchFamily="49" charset="0"/>
+            </a:endParaRPr>
           </a:p>
         </p:txBody>
       </p:sp>

</xml_diff>

<commit_message>
rewrite and added feature for binom_bf_equality
</commit_message>
<xml_diff>
--- a/manuscript/scheme_multibridge.pptx
+++ b/manuscript/scheme_multibridge.pptx
@@ -106,7 +106,18 @@
   </p:defaultTextStyle>
   <p:extLst>
     <p:ext uri="{EFAFB233-063F-42B5-8137-9DF3F51BA10A}">
-      <p15:sldGuideLst xmlns:p15="http://schemas.microsoft.com/office/powerpoint/2012/main"/>
+      <p15:sldGuideLst xmlns:p15="http://schemas.microsoft.com/office/powerpoint/2012/main">
+        <p15:guide id="1" orient="horz" pos="2592" userDrawn="1">
+          <p15:clr>
+            <a:srgbClr val="A4A3A4"/>
+          </p15:clr>
+        </p15:guide>
+        <p15:guide id="2" pos="1264" userDrawn="1">
+          <p15:clr>
+            <a:srgbClr val="A4A3A4"/>
+          </p15:clr>
+        </p15:guide>
+      </p15:sldGuideLst>
     </p:ext>
   </p:extLst>
 </p:presentation>
@@ -243,7 +254,7 @@
           <a:p>
             <a:fld id="{B3A21784-E1B4-8C4A-A52C-8A1F4FEBB89F}" type="datetimeFigureOut">
               <a:rPr lang="en-US" smtClean="0"/>
-              <a:t>11/30/20</a:t>
+              <a:t>2/18/21</a:t>
             </a:fld>
             <a:endParaRPr lang="en-US"/>
           </a:p>
@@ -413,7 +424,7 @@
           <a:p>
             <a:fld id="{B3A21784-E1B4-8C4A-A52C-8A1F4FEBB89F}" type="datetimeFigureOut">
               <a:rPr lang="en-US" smtClean="0"/>
-              <a:t>11/30/20</a:t>
+              <a:t>2/18/21</a:t>
             </a:fld>
             <a:endParaRPr lang="en-US"/>
           </a:p>
@@ -593,7 +604,7 @@
           <a:p>
             <a:fld id="{B3A21784-E1B4-8C4A-A52C-8A1F4FEBB89F}" type="datetimeFigureOut">
               <a:rPr lang="en-US" smtClean="0"/>
-              <a:t>11/30/20</a:t>
+              <a:t>2/18/21</a:t>
             </a:fld>
             <a:endParaRPr lang="en-US"/>
           </a:p>
@@ -763,7 +774,7 @@
           <a:p>
             <a:fld id="{B3A21784-E1B4-8C4A-A52C-8A1F4FEBB89F}" type="datetimeFigureOut">
               <a:rPr lang="en-US" smtClean="0"/>
-              <a:t>11/30/20</a:t>
+              <a:t>2/18/21</a:t>
             </a:fld>
             <a:endParaRPr lang="en-US"/>
           </a:p>
@@ -1009,7 +1020,7 @@
           <a:p>
             <a:fld id="{B3A21784-E1B4-8C4A-A52C-8A1F4FEBB89F}" type="datetimeFigureOut">
               <a:rPr lang="en-US" smtClean="0"/>
-              <a:t>11/30/20</a:t>
+              <a:t>2/18/21</a:t>
             </a:fld>
             <a:endParaRPr lang="en-US"/>
           </a:p>
@@ -1241,7 +1252,7 @@
           <a:p>
             <a:fld id="{B3A21784-E1B4-8C4A-A52C-8A1F4FEBB89F}" type="datetimeFigureOut">
               <a:rPr lang="en-US" smtClean="0"/>
-              <a:t>11/30/20</a:t>
+              <a:t>2/18/21</a:t>
             </a:fld>
             <a:endParaRPr lang="en-US"/>
           </a:p>
@@ -1608,7 +1619,7 @@
           <a:p>
             <a:fld id="{B3A21784-E1B4-8C4A-A52C-8A1F4FEBB89F}" type="datetimeFigureOut">
               <a:rPr lang="en-US" smtClean="0"/>
-              <a:t>11/30/20</a:t>
+              <a:t>2/18/21</a:t>
             </a:fld>
             <a:endParaRPr lang="en-US"/>
           </a:p>
@@ -1726,7 +1737,7 @@
           <a:p>
             <a:fld id="{B3A21784-E1B4-8C4A-A52C-8A1F4FEBB89F}" type="datetimeFigureOut">
               <a:rPr lang="en-US" smtClean="0"/>
-              <a:t>11/30/20</a:t>
+              <a:t>2/18/21</a:t>
             </a:fld>
             <a:endParaRPr lang="en-US"/>
           </a:p>
@@ -1821,7 +1832,7 @@
           <a:p>
             <a:fld id="{B3A21784-E1B4-8C4A-A52C-8A1F4FEBB89F}" type="datetimeFigureOut">
               <a:rPr lang="en-US" smtClean="0"/>
-              <a:t>11/30/20</a:t>
+              <a:t>2/18/21</a:t>
             </a:fld>
             <a:endParaRPr lang="en-US"/>
           </a:p>
@@ -2098,7 +2109,7 @@
           <a:p>
             <a:fld id="{B3A21784-E1B4-8C4A-A52C-8A1F4FEBB89F}" type="datetimeFigureOut">
               <a:rPr lang="en-US" smtClean="0"/>
-              <a:t>11/30/20</a:t>
+              <a:t>2/18/21</a:t>
             </a:fld>
             <a:endParaRPr lang="en-US"/>
           </a:p>
@@ -2355,7 +2366,7 @@
           <a:p>
             <a:fld id="{B3A21784-E1B4-8C4A-A52C-8A1F4FEBB89F}" type="datetimeFigureOut">
               <a:rPr lang="en-US" smtClean="0"/>
-              <a:t>11/30/20</a:t>
+              <a:t>2/18/21</a:t>
             </a:fld>
             <a:endParaRPr lang="en-US"/>
           </a:p>
@@ -2568,7 +2579,7 @@
           <a:p>
             <a:fld id="{B3A21784-E1B4-8C4A-A52C-8A1F4FEBB89F}" type="datetimeFigureOut">
               <a:rPr lang="en-US" smtClean="0"/>
-              <a:t>11/30/20</a:t>
+              <a:t>2/18/21</a:t>
             </a:fld>
             <a:endParaRPr lang="en-US"/>
           </a:p>
@@ -3099,7 +3110,7 @@
         </p:nvSpPr>
         <p:spPr>
           <a:xfrm>
-            <a:off x="7287560" y="3691662"/>
+            <a:off x="7596035" y="3691662"/>
             <a:ext cx="1857078" cy="692497"/>
           </a:xfrm>
           <a:prstGeom prst="rect">
@@ -3138,8 +3149,8 @@
         </p:nvCxnSpPr>
         <p:spPr>
           <a:xfrm flipH="1">
-            <a:off x="1970317" y="2098252"/>
-            <a:ext cx="5080510" cy="397619"/>
+            <a:off x="1994270" y="2098252"/>
+            <a:ext cx="5056557" cy="397619"/>
           </a:xfrm>
           <a:prstGeom prst="straightConnector1">
             <a:avLst/>
@@ -3244,7 +3255,7 @@
         </p:nvSpPr>
         <p:spPr>
           <a:xfrm>
-            <a:off x="1559306" y="6109243"/>
+            <a:off x="1638344" y="6109243"/>
             <a:ext cx="829073" cy="307777"/>
           </a:xfrm>
           <a:prstGeom prst="rect">
@@ -3282,7 +3293,7 @@
         </p:nvSpPr>
         <p:spPr>
           <a:xfrm>
-            <a:off x="1323723" y="2797181"/>
+            <a:off x="1402761" y="2797181"/>
             <a:ext cx="1151277" cy="307777"/>
           </a:xfrm>
           <a:prstGeom prst="rect">
@@ -3462,7 +3473,7 @@
         </p:nvSpPr>
         <p:spPr>
           <a:xfrm>
-            <a:off x="4579143" y="2797953"/>
+            <a:off x="4777449" y="2797953"/>
             <a:ext cx="1688283" cy="307777"/>
           </a:xfrm>
           <a:prstGeom prst="rect">
@@ -3507,7 +3518,7 @@
         </p:nvSpPr>
         <p:spPr>
           <a:xfrm>
-            <a:off x="7625977" y="2797181"/>
+            <a:off x="7934452" y="2797181"/>
             <a:ext cx="1151277" cy="307777"/>
           </a:xfrm>
           <a:prstGeom prst="rect">
@@ -3550,7 +3561,7 @@
         <p:spPr>
           <a:xfrm>
             <a:off x="7050827" y="2098252"/>
-            <a:ext cx="1122486" cy="397619"/>
+            <a:ext cx="1430961" cy="397619"/>
           </a:xfrm>
           <a:prstGeom prst="straightConnector1">
             <a:avLst/>
@@ -3585,14 +3596,13 @@
           </p:cNvPr>
           <p:cNvCxnSpPr>
             <a:cxnSpLocks/>
-            <a:stCxn id="16" idx="2"/>
             <a:endCxn id="228" idx="0"/>
           </p:cNvCxnSpPr>
           <p:nvPr/>
         </p:nvCxnSpPr>
         <p:spPr>
           <a:xfrm flipH="1">
-            <a:off x="5408992" y="2098252"/>
+            <a:off x="5607298" y="2098252"/>
             <a:ext cx="1641835" cy="397619"/>
           </a:xfrm>
           <a:prstGeom prst="straightConnector1">
@@ -3757,7 +3767,7 @@
         </p:nvSpPr>
         <p:spPr>
           <a:xfrm>
-            <a:off x="1085075" y="4147270"/>
+            <a:off x="1231035" y="4101974"/>
             <a:ext cx="482824" cy="292388"/>
           </a:xfrm>
           <a:prstGeom prst="rect">
@@ -4173,8 +4183,8 @@
         </p:nvSpPr>
         <p:spPr>
           <a:xfrm>
-            <a:off x="300142" y="3729804"/>
-            <a:ext cx="3354479" cy="1578018"/>
+            <a:off x="435351" y="3729804"/>
+            <a:ext cx="3114541" cy="1767918"/>
           </a:xfrm>
           <a:prstGeom prst="roundRect">
             <a:avLst/>
@@ -4224,9 +4234,9 @@
           <p:nvPr/>
         </p:nvCxnSpPr>
         <p:spPr>
-          <a:xfrm>
-            <a:off x="1970317" y="3401696"/>
-            <a:ext cx="7065" cy="328108"/>
+          <a:xfrm flipH="1">
+            <a:off x="1992622" y="3401696"/>
+            <a:ext cx="1648" cy="328108"/>
           </a:xfrm>
           <a:prstGeom prst="straightConnector1">
             <a:avLst/>
@@ -4267,9 +4277,9 @@
           <p:nvPr/>
         </p:nvCxnSpPr>
         <p:spPr>
-          <a:xfrm flipH="1">
-            <a:off x="1970316" y="5307822"/>
-            <a:ext cx="7066" cy="500233"/>
+          <a:xfrm>
+            <a:off x="1992622" y="5497722"/>
+            <a:ext cx="5169" cy="310333"/>
           </a:xfrm>
           <a:prstGeom prst="straightConnector1">
             <a:avLst/>
@@ -4398,7 +4408,7 @@
         </p:nvSpPr>
         <p:spPr>
           <a:xfrm>
-            <a:off x="870334" y="2495871"/>
+            <a:off x="894287" y="2495871"/>
             <a:ext cx="2199966" cy="905825"/>
           </a:xfrm>
           <a:prstGeom prst="diamond">
@@ -4446,7 +4456,7 @@
         </p:nvSpPr>
         <p:spPr>
           <a:xfrm>
-            <a:off x="4309009" y="2495871"/>
+            <a:off x="4507315" y="2495871"/>
             <a:ext cx="2199966" cy="905825"/>
           </a:xfrm>
           <a:prstGeom prst="diamond">
@@ -4494,7 +4504,7 @@
         </p:nvSpPr>
         <p:spPr>
           <a:xfrm>
-            <a:off x="7073330" y="2495871"/>
+            <a:off x="7381805" y="2495871"/>
             <a:ext cx="2199966" cy="905825"/>
           </a:xfrm>
           <a:prstGeom prst="diamond">
@@ -4590,7 +4600,7 @@
         </p:nvSpPr>
         <p:spPr>
           <a:xfrm>
-            <a:off x="418052" y="4149444"/>
+            <a:off x="586046" y="4099599"/>
             <a:ext cx="582211" cy="292388"/>
           </a:xfrm>
           <a:prstGeom prst="rect">
@@ -4646,7 +4656,7 @@
         </p:nvSpPr>
         <p:spPr>
           <a:xfrm>
-            <a:off x="618809" y="4907100"/>
+            <a:off x="2051254" y="4802563"/>
             <a:ext cx="1277914" cy="292388"/>
           </a:xfrm>
           <a:prstGeom prst="rect">
@@ -4702,7 +4712,7 @@
         </p:nvSpPr>
         <p:spPr>
           <a:xfrm>
-            <a:off x="1630678" y="4143869"/>
+            <a:off x="2422729" y="4098473"/>
             <a:ext cx="979755" cy="292388"/>
           </a:xfrm>
           <a:prstGeom prst="rect">
@@ -4758,7 +4768,7 @@
         </p:nvSpPr>
         <p:spPr>
           <a:xfrm>
-            <a:off x="1992295" y="4916665"/>
+            <a:off x="1451951" y="5141664"/>
             <a:ext cx="1178528" cy="292388"/>
           </a:xfrm>
           <a:prstGeom prst="rect">
@@ -5109,8 +5119,8 @@
         </p:nvSpPr>
         <p:spPr>
           <a:xfrm>
-            <a:off x="4444629" y="3727594"/>
-            <a:ext cx="1914636" cy="1408614"/>
+            <a:off x="4167713" y="3727594"/>
+            <a:ext cx="2881486" cy="1408614"/>
           </a:xfrm>
           <a:prstGeom prst="roundRect">
             <a:avLst/>
@@ -5157,7 +5167,7 @@
         </p:nvSpPr>
         <p:spPr>
           <a:xfrm>
-            <a:off x="4666244" y="4755854"/>
+            <a:off x="4779189" y="4763173"/>
             <a:ext cx="1576072" cy="292388"/>
           </a:xfrm>
           <a:prstGeom prst="rect">
@@ -5213,7 +5223,7 @@
         </p:nvSpPr>
         <p:spPr>
           <a:xfrm>
-            <a:off x="4676351" y="4394539"/>
+            <a:off x="4217125" y="4415590"/>
             <a:ext cx="1079142" cy="292388"/>
           </a:xfrm>
           <a:prstGeom prst="rect">
@@ -5269,7 +5279,7 @@
         </p:nvSpPr>
         <p:spPr>
           <a:xfrm>
-            <a:off x="7175390" y="3700266"/>
+            <a:off x="7483865" y="3700266"/>
             <a:ext cx="2022163" cy="1408614"/>
           </a:xfrm>
           <a:prstGeom prst="roundRect">
@@ -5317,7 +5327,7 @@
         </p:nvSpPr>
         <p:spPr>
           <a:xfrm>
-            <a:off x="7409336" y="4716966"/>
+            <a:off x="7717811" y="4716966"/>
             <a:ext cx="1576072" cy="292388"/>
           </a:xfrm>
           <a:prstGeom prst="rect">
@@ -5376,7 +5386,7 @@
         </p:nvSpPr>
         <p:spPr>
           <a:xfrm>
-            <a:off x="7418091" y="4387587"/>
+            <a:off x="7726566" y="4387587"/>
             <a:ext cx="1576072" cy="292388"/>
           </a:xfrm>
           <a:prstGeom prst="rect">
@@ -5435,9 +5445,9 @@
           <p:nvPr/>
         </p:nvCxnSpPr>
         <p:spPr>
-          <a:xfrm flipH="1">
-            <a:off x="5401947" y="3401696"/>
-            <a:ext cx="7045" cy="325898"/>
+          <a:xfrm>
+            <a:off x="5607298" y="3401696"/>
+            <a:ext cx="1158" cy="325898"/>
           </a:xfrm>
           <a:prstGeom prst="straightConnector1">
             <a:avLst/>
@@ -5479,7 +5489,7 @@
         </p:nvCxnSpPr>
         <p:spPr>
           <a:xfrm>
-            <a:off x="8173313" y="3401696"/>
+            <a:off x="8481788" y="3401696"/>
             <a:ext cx="13159" cy="298570"/>
           </a:xfrm>
           <a:prstGeom prst="straightConnector1">
@@ -5522,8 +5532,8 @@
         </p:nvCxnSpPr>
         <p:spPr>
           <a:xfrm>
-            <a:off x="3070299" y="6260968"/>
-            <a:ext cx="915204" cy="3368"/>
+            <a:off x="3097774" y="6260968"/>
+            <a:ext cx="887729" cy="3368"/>
           </a:xfrm>
           <a:prstGeom prst="straightConnector1">
             <a:avLst/>
@@ -5609,7 +5619,7 @@
         </p:nvSpPr>
         <p:spPr>
           <a:xfrm>
-            <a:off x="870333" y="5808055"/>
+            <a:off x="897808" y="5808055"/>
             <a:ext cx="2199966" cy="905825"/>
           </a:xfrm>
           <a:prstGeom prst="diamond">
@@ -5692,7 +5702,7 @@
         </p:nvSpPr>
         <p:spPr>
           <a:xfrm>
-            <a:off x="385401" y="4538647"/>
+            <a:off x="1504970" y="4445266"/>
             <a:ext cx="681597" cy="292388"/>
           </a:xfrm>
           <a:prstGeom prst="rect">
@@ -5737,7 +5747,7 @@
         </p:nvSpPr>
         <p:spPr>
           <a:xfrm>
-            <a:off x="2691453" y="4143907"/>
+            <a:off x="670968" y="4445266"/>
             <a:ext cx="780983" cy="292388"/>
           </a:xfrm>
           <a:prstGeom prst="rect">
@@ -5782,7 +5792,7 @@
         </p:nvSpPr>
         <p:spPr>
           <a:xfrm>
-            <a:off x="2309252" y="4538647"/>
+            <a:off x="686208" y="4798812"/>
             <a:ext cx="1277914" cy="292388"/>
           </a:xfrm>
           <a:prstGeom prst="rect">
@@ -5838,7 +5848,7 @@
         </p:nvSpPr>
         <p:spPr>
           <a:xfrm>
-            <a:off x="1144790" y="4538647"/>
+            <a:off x="2237100" y="4444766"/>
             <a:ext cx="1079142" cy="292388"/>
           </a:xfrm>
           <a:prstGeom prst="rect">
@@ -5877,6 +5887,107 @@
               <a:latin typeface="Courier New" panose="02070309020205020404" pitchFamily="49" charset="0"/>
               <a:cs typeface="Courier New" panose="02070309020205020404" pitchFamily="49" charset="0"/>
             </a:endParaRPr>
+          </a:p>
+        </p:txBody>
+      </p:sp>
+      <p:sp>
+        <p:nvSpPr>
+          <p:cNvPr id="67" name="TextBox 66">
+            <a:extLst>
+              <a:ext uri="{FF2B5EF4-FFF2-40B4-BE49-F238E27FC236}">
+                <a16:creationId xmlns:a16="http://schemas.microsoft.com/office/drawing/2014/main" id="{D6ECCEC3-157B-844F-9AB5-A46E8A10DA4F}"/>
+              </a:ext>
+            </a:extLst>
+          </p:cNvPr>
+          <p:cNvSpPr txBox="1"/>
+          <p:nvPr/>
+        </p:nvSpPr>
+        <p:spPr>
+          <a:xfrm>
+            <a:off x="5323986" y="4415590"/>
+            <a:ext cx="1675459" cy="292388"/>
+          </a:xfrm>
+          <a:prstGeom prst="rect">
+            <a:avLst/>
+          </a:prstGeom>
+          <a:noFill/>
+          <a:ln w="19050">
+            <a:solidFill>
+              <a:schemeClr val="accent1">
+                <a:shade val="50000"/>
+              </a:schemeClr>
+            </a:solidFill>
+          </a:ln>
+        </p:spPr>
+        <p:txBody>
+          <a:bodyPr wrap="none" rtlCol="0">
+            <a:spAutoFit/>
+          </a:bodyPr>
+          <a:lstStyle/>
+          <a:p>
+            <a:r>
+              <a:rPr lang="en-US" sz="1300" dirty="0">
+                <a:latin typeface="Courier New" panose="02070309020205020404" pitchFamily="49" charset="0"/>
+                <a:cs typeface="Courier New" panose="02070309020205020404" pitchFamily="49" charset="0"/>
+              </a:rPr>
+              <a:t>$</a:t>
+            </a:r>
+            <a:r>
+              <a:rPr lang="en-US" sz="1300" dirty="0" err="1">
+                <a:latin typeface="Courier New" panose="02070309020205020404" pitchFamily="49" charset="0"/>
+                <a:cs typeface="Courier New" panose="02070309020205020404" pitchFamily="49" charset="0"/>
+              </a:rPr>
+              <a:t>error_measures</a:t>
+            </a:r>
+            <a:endParaRPr lang="en-US" sz="1300" dirty="0">
+              <a:latin typeface="Courier New" panose="02070309020205020404" pitchFamily="49" charset="0"/>
+              <a:cs typeface="Courier New" panose="02070309020205020404" pitchFamily="49" charset="0"/>
+            </a:endParaRPr>
+          </a:p>
+        </p:txBody>
+      </p:sp>
+      <p:sp>
+        <p:nvSpPr>
+          <p:cNvPr id="69" name="TextBox 68">
+            <a:extLst>
+              <a:ext uri="{FF2B5EF4-FFF2-40B4-BE49-F238E27FC236}">
+                <a16:creationId xmlns:a16="http://schemas.microsoft.com/office/drawing/2014/main" id="{8D6C3FF9-D5EB-8341-8E3D-859421B4E4A0}"/>
+              </a:ext>
+            </a:extLst>
+          </p:cNvPr>
+          <p:cNvSpPr txBox="1"/>
+          <p:nvPr/>
+        </p:nvSpPr>
+        <p:spPr>
+          <a:xfrm>
+            <a:off x="1778734" y="4101392"/>
+            <a:ext cx="582211" cy="292388"/>
+          </a:xfrm>
+          <a:prstGeom prst="rect">
+            <a:avLst/>
+          </a:prstGeom>
+          <a:noFill/>
+          <a:ln w="19050">
+            <a:solidFill>
+              <a:schemeClr val="accent1">
+                <a:shade val="50000"/>
+              </a:schemeClr>
+            </a:solidFill>
+          </a:ln>
+        </p:spPr>
+        <p:txBody>
+          <a:bodyPr wrap="square" rtlCol="0">
+            <a:spAutoFit/>
+          </a:bodyPr>
+          <a:lstStyle/>
+          <a:p>
+            <a:r>
+              <a:rPr lang="en-US" sz="1300" dirty="0">
+                <a:latin typeface="Courier New" panose="02070309020205020404" pitchFamily="49" charset="0"/>
+                <a:cs typeface="Courier New" panose="02070309020205020404" pitchFamily="49" charset="0"/>
+              </a:rPr>
+              <a:t>$re2</a:t>
+            </a:r>
           </a:p>
         </p:txBody>
       </p:sp>

</xml_diff>

<commit_message>
fixed typo in journals documentation
</commit_message>
<xml_diff>
--- a/manuscript/scheme_multibridge.pptx
+++ b/manuscript/scheme_multibridge.pptx
@@ -254,7 +254,7 @@
           <a:p>
             <a:fld id="{B3A21784-E1B4-8C4A-A52C-8A1F4FEBB89F}" type="datetimeFigureOut">
               <a:rPr lang="en-US" smtClean="0"/>
-              <a:t>2/18/21</a:t>
+              <a:t>2/22/21</a:t>
             </a:fld>
             <a:endParaRPr lang="en-US"/>
           </a:p>
@@ -424,7 +424,7 @@
           <a:p>
             <a:fld id="{B3A21784-E1B4-8C4A-A52C-8A1F4FEBB89F}" type="datetimeFigureOut">
               <a:rPr lang="en-US" smtClean="0"/>
-              <a:t>2/18/21</a:t>
+              <a:t>2/22/21</a:t>
             </a:fld>
             <a:endParaRPr lang="en-US"/>
           </a:p>
@@ -604,7 +604,7 @@
           <a:p>
             <a:fld id="{B3A21784-E1B4-8C4A-A52C-8A1F4FEBB89F}" type="datetimeFigureOut">
               <a:rPr lang="en-US" smtClean="0"/>
-              <a:t>2/18/21</a:t>
+              <a:t>2/22/21</a:t>
             </a:fld>
             <a:endParaRPr lang="en-US"/>
           </a:p>
@@ -774,7 +774,7 @@
           <a:p>
             <a:fld id="{B3A21784-E1B4-8C4A-A52C-8A1F4FEBB89F}" type="datetimeFigureOut">
               <a:rPr lang="en-US" smtClean="0"/>
-              <a:t>2/18/21</a:t>
+              <a:t>2/22/21</a:t>
             </a:fld>
             <a:endParaRPr lang="en-US"/>
           </a:p>
@@ -1020,7 +1020,7 @@
           <a:p>
             <a:fld id="{B3A21784-E1B4-8C4A-A52C-8A1F4FEBB89F}" type="datetimeFigureOut">
               <a:rPr lang="en-US" smtClean="0"/>
-              <a:t>2/18/21</a:t>
+              <a:t>2/22/21</a:t>
             </a:fld>
             <a:endParaRPr lang="en-US"/>
           </a:p>
@@ -1252,7 +1252,7 @@
           <a:p>
             <a:fld id="{B3A21784-E1B4-8C4A-A52C-8A1F4FEBB89F}" type="datetimeFigureOut">
               <a:rPr lang="en-US" smtClean="0"/>
-              <a:t>2/18/21</a:t>
+              <a:t>2/22/21</a:t>
             </a:fld>
             <a:endParaRPr lang="en-US"/>
           </a:p>
@@ -1619,7 +1619,7 @@
           <a:p>
             <a:fld id="{B3A21784-E1B4-8C4A-A52C-8A1F4FEBB89F}" type="datetimeFigureOut">
               <a:rPr lang="en-US" smtClean="0"/>
-              <a:t>2/18/21</a:t>
+              <a:t>2/22/21</a:t>
             </a:fld>
             <a:endParaRPr lang="en-US"/>
           </a:p>
@@ -1737,7 +1737,7 @@
           <a:p>
             <a:fld id="{B3A21784-E1B4-8C4A-A52C-8A1F4FEBB89F}" type="datetimeFigureOut">
               <a:rPr lang="en-US" smtClean="0"/>
-              <a:t>2/18/21</a:t>
+              <a:t>2/22/21</a:t>
             </a:fld>
             <a:endParaRPr lang="en-US"/>
           </a:p>
@@ -1832,7 +1832,7 @@
           <a:p>
             <a:fld id="{B3A21784-E1B4-8C4A-A52C-8A1F4FEBB89F}" type="datetimeFigureOut">
               <a:rPr lang="en-US" smtClean="0"/>
-              <a:t>2/18/21</a:t>
+              <a:t>2/22/21</a:t>
             </a:fld>
             <a:endParaRPr lang="en-US"/>
           </a:p>
@@ -2109,7 +2109,7 @@
           <a:p>
             <a:fld id="{B3A21784-E1B4-8C4A-A52C-8A1F4FEBB89F}" type="datetimeFigureOut">
               <a:rPr lang="en-US" smtClean="0"/>
-              <a:t>2/18/21</a:t>
+              <a:t>2/22/21</a:t>
             </a:fld>
             <a:endParaRPr lang="en-US"/>
           </a:p>
@@ -2366,7 +2366,7 @@
           <a:p>
             <a:fld id="{B3A21784-E1B4-8C4A-A52C-8A1F4FEBB89F}" type="datetimeFigureOut">
               <a:rPr lang="en-US" smtClean="0"/>
-              <a:t>2/18/21</a:t>
+              <a:t>2/22/21</a:t>
             </a:fld>
             <a:endParaRPr lang="en-US"/>
           </a:p>
@@ -2579,7 +2579,7 @@
           <a:p>
             <a:fld id="{B3A21784-E1B4-8C4A-A52C-8A1F4FEBB89F}" type="datetimeFigureOut">
               <a:rPr lang="en-US" smtClean="0"/>
-              <a:t>2/18/21</a:t>
+              <a:t>2/22/21</a:t>
             </a:fld>
             <a:endParaRPr lang="en-US"/>
           </a:p>
@@ -3110,8 +3110,8 @@
         </p:nvSpPr>
         <p:spPr>
           <a:xfrm>
-            <a:off x="7596035" y="3691662"/>
-            <a:ext cx="1857078" cy="692497"/>
+            <a:off x="7486872" y="3691662"/>
+            <a:ext cx="2137898" cy="692497"/>
           </a:xfrm>
           <a:prstGeom prst="rect">
             <a:avLst/>
@@ -3126,7 +3126,7 @@
           <a:p>
             <a:r>
               <a:rPr lang="en-US" sz="1300" b="1" dirty="0"/>
-              <a:t>Samples from truncated densities used for bridge sampling</a:t>
+              <a:t>Samples from constrained densities used for bridge sampling</a:t>
             </a:r>
           </a:p>
         </p:txBody>
@@ -5279,8 +5279,8 @@
         </p:nvSpPr>
         <p:spPr>
           <a:xfrm>
-            <a:off x="7483865" y="3700266"/>
-            <a:ext cx="2022163" cy="1408614"/>
+            <a:off x="7396347" y="3700266"/>
+            <a:ext cx="2190668" cy="1408614"/>
           </a:xfrm>
           <a:prstGeom prst="roundRect">
             <a:avLst/>
@@ -5490,7 +5490,7 @@
         <p:spPr>
           <a:xfrm>
             <a:off x="8481788" y="3401696"/>
-            <a:ext cx="13159" cy="298570"/>
+            <a:ext cx="9893" cy="298570"/>
           </a:xfrm>
           <a:prstGeom prst="straightConnector1">
             <a:avLst/>

</xml_diff>